<commit_message>
002 travail sur h5p structure - 004 amélioration visuel
</commit_message>
<xml_diff>
--- a/thématique SI/004 Définir le SI/rsrc/exercice_004.pptx
+++ b/thématique SI/004 Définir le SI/rsrc/exercice_004.pptx
@@ -7,6 +7,7 @@
   <p:sldIdLst>
     <p:sldId id="258" r:id="rId2"/>
     <p:sldId id="259" r:id="rId3"/>
+    <p:sldId id="260" r:id="rId4"/>
   </p:sldIdLst>
   <p:sldSz cx="12192000" cy="6858000"/>
   <p:notesSz cx="6858000" cy="9144000"/>
@@ -260,7 +261,7 @@
           <a:p>
             <a:fld id="{7C2B7642-0AE5-8B41-89FF-3413471F5A20}" type="datetimeFigureOut">
               <a:rPr lang="fr-FR" smtClean="0"/>
-              <a:t>12/05/2023</a:t>
+              <a:t>22/05/2023</a:t>
             </a:fld>
             <a:endParaRPr lang="fr-FR"/>
           </a:p>
@@ -458,7 +459,7 @@
           <a:p>
             <a:fld id="{7C2B7642-0AE5-8B41-89FF-3413471F5A20}" type="datetimeFigureOut">
               <a:rPr lang="fr-FR" smtClean="0"/>
-              <a:t>12/05/2023</a:t>
+              <a:t>22/05/2023</a:t>
             </a:fld>
             <a:endParaRPr lang="fr-FR"/>
           </a:p>
@@ -666,7 +667,7 @@
           <a:p>
             <a:fld id="{7C2B7642-0AE5-8B41-89FF-3413471F5A20}" type="datetimeFigureOut">
               <a:rPr lang="fr-FR" smtClean="0"/>
-              <a:t>12/05/2023</a:t>
+              <a:t>22/05/2023</a:t>
             </a:fld>
             <a:endParaRPr lang="fr-FR"/>
           </a:p>
@@ -864,7 +865,7 @@
           <a:p>
             <a:fld id="{7C2B7642-0AE5-8B41-89FF-3413471F5A20}" type="datetimeFigureOut">
               <a:rPr lang="fr-FR" smtClean="0"/>
-              <a:t>12/05/2023</a:t>
+              <a:t>22/05/2023</a:t>
             </a:fld>
             <a:endParaRPr lang="fr-FR"/>
           </a:p>
@@ -1139,7 +1140,7 @@
           <a:p>
             <a:fld id="{7C2B7642-0AE5-8B41-89FF-3413471F5A20}" type="datetimeFigureOut">
               <a:rPr lang="fr-FR" smtClean="0"/>
-              <a:t>12/05/2023</a:t>
+              <a:t>22/05/2023</a:t>
             </a:fld>
             <a:endParaRPr lang="fr-FR"/>
           </a:p>
@@ -1404,7 +1405,7 @@
           <a:p>
             <a:fld id="{7C2B7642-0AE5-8B41-89FF-3413471F5A20}" type="datetimeFigureOut">
               <a:rPr lang="fr-FR" smtClean="0"/>
-              <a:t>12/05/2023</a:t>
+              <a:t>22/05/2023</a:t>
             </a:fld>
             <a:endParaRPr lang="fr-FR"/>
           </a:p>
@@ -1816,7 +1817,7 @@
           <a:p>
             <a:fld id="{7C2B7642-0AE5-8B41-89FF-3413471F5A20}" type="datetimeFigureOut">
               <a:rPr lang="fr-FR" smtClean="0"/>
-              <a:t>12/05/2023</a:t>
+              <a:t>22/05/2023</a:t>
             </a:fld>
             <a:endParaRPr lang="fr-FR"/>
           </a:p>
@@ -1957,7 +1958,7 @@
           <a:p>
             <a:fld id="{7C2B7642-0AE5-8B41-89FF-3413471F5A20}" type="datetimeFigureOut">
               <a:rPr lang="fr-FR" smtClean="0"/>
-              <a:t>12/05/2023</a:t>
+              <a:t>22/05/2023</a:t>
             </a:fld>
             <a:endParaRPr lang="fr-FR"/>
           </a:p>
@@ -2070,7 +2071,7 @@
           <a:p>
             <a:fld id="{7C2B7642-0AE5-8B41-89FF-3413471F5A20}" type="datetimeFigureOut">
               <a:rPr lang="fr-FR" smtClean="0"/>
-              <a:t>12/05/2023</a:t>
+              <a:t>22/05/2023</a:t>
             </a:fld>
             <a:endParaRPr lang="fr-FR"/>
           </a:p>
@@ -2381,7 +2382,7 @@
           <a:p>
             <a:fld id="{7C2B7642-0AE5-8B41-89FF-3413471F5A20}" type="datetimeFigureOut">
               <a:rPr lang="fr-FR" smtClean="0"/>
-              <a:t>12/05/2023</a:t>
+              <a:t>22/05/2023</a:t>
             </a:fld>
             <a:endParaRPr lang="fr-FR"/>
           </a:p>
@@ -2669,7 +2670,7 @@
           <a:p>
             <a:fld id="{7C2B7642-0AE5-8B41-89FF-3413471F5A20}" type="datetimeFigureOut">
               <a:rPr lang="fr-FR" smtClean="0"/>
-              <a:t>12/05/2023</a:t>
+              <a:t>22/05/2023</a:t>
             </a:fld>
             <a:endParaRPr lang="fr-FR"/>
           </a:p>
@@ -2910,7 +2911,7 @@
           <a:p>
             <a:fld id="{7C2B7642-0AE5-8B41-89FF-3413471F5A20}" type="datetimeFigureOut">
               <a:rPr lang="fr-FR" smtClean="0"/>
-              <a:t>12/05/2023</a:t>
+              <a:t>22/05/2023</a:t>
             </a:fld>
             <a:endParaRPr lang="fr-FR"/>
           </a:p>
@@ -3329,10 +3330,10 @@
       </p:grpSpPr>
       <p:sp>
         <p:nvSpPr>
-          <p:cNvPr id="2" name="Rectangle 1">
-            <a:extLst>
-              <a:ext uri="{FF2B5EF4-FFF2-40B4-BE49-F238E27FC236}">
-                <a16:creationId xmlns:a16="http://schemas.microsoft.com/office/drawing/2014/main" id="{761B9443-38CF-0D90-A9B5-3473D15B9FBA}"/>
+          <p:cNvPr id="3" name="Rectangle 2">
+            <a:extLst>
+              <a:ext uri="{FF2B5EF4-FFF2-40B4-BE49-F238E27FC236}">
+                <a16:creationId xmlns:a16="http://schemas.microsoft.com/office/drawing/2014/main" id="{EE6D0A12-8253-EC2C-C110-4E72DC5CF92D}"/>
               </a:ext>
             </a:extLst>
           </p:cNvPr>
@@ -3341,15 +3342,21 @@
         </p:nvSpPr>
         <p:spPr bwMode="auto">
           <a:xfrm>
-            <a:off x="7327410" y="2936687"/>
-            <a:ext cx="2448272" cy="792088"/>
+            <a:off x="-15154" y="1621614"/>
+            <a:ext cx="12191999" cy="5236386"/>
           </a:xfrm>
           <a:prstGeom prst="rect">
             <a:avLst/>
           </a:prstGeom>
           <a:solidFill>
-            <a:srgbClr val="4BACC7"/>
-          </a:solidFill>
+            <a:schemeClr val="accent1">
+              <a:lumMod val="20000"/>
+              <a:lumOff val="80000"/>
+            </a:schemeClr>
+          </a:solidFill>
+          <a:ln>
+            <a:noFill/>
+          </a:ln>
         </p:spPr>
         <p:style>
           <a:lnRef idx="1">
@@ -3366,132 +3373,33 @@
           </a:fontRef>
         </p:style>
         <p:txBody>
-          <a:bodyPr rtlCol="0" anchor="ctr"/>
+          <a:bodyPr rtlCol="0" anchor="t" anchorCtr="0"/>
           <a:lstStyle/>
           <a:p>
             <a:pPr algn="ctr"/>
-            <a:r>
-              <a:rPr lang="fr-FR" sz="2400" dirty="0">
-                <a:solidFill>
-                  <a:schemeClr val="lt1"/>
-                </a:solidFill>
-              </a:rPr>
-              <a:t>S.I.</a:t>
-            </a:r>
-          </a:p>
-        </p:txBody>
-      </p:sp>
-      <p:cxnSp>
-        <p:nvCxnSpPr>
-          <p:cNvPr id="4" name="Straight Arrow Connector 3">
-            <a:extLst>
-              <a:ext uri="{FF2B5EF4-FFF2-40B4-BE49-F238E27FC236}">
-                <a16:creationId xmlns:a16="http://schemas.microsoft.com/office/drawing/2014/main" id="{7F745A67-579B-41E4-CD3E-9F59AA81811E}"/>
-              </a:ext>
-            </a:extLst>
-          </p:cNvPr>
-          <p:cNvCxnSpPr>
-            <a:cxnSpLocks/>
-          </p:cNvCxnSpPr>
+            <a:endParaRPr lang="fr-FR" sz="3200" dirty="0">
+              <a:solidFill>
+                <a:schemeClr val="lt1"/>
+              </a:solidFill>
+            </a:endParaRPr>
+          </a:p>
+        </p:txBody>
+      </p:sp>
+      <p:sp>
+        <p:nvSpPr>
+          <p:cNvPr id="2" name="Rectangle 1">
+            <a:extLst>
+              <a:ext uri="{FF2B5EF4-FFF2-40B4-BE49-F238E27FC236}">
+                <a16:creationId xmlns:a16="http://schemas.microsoft.com/office/drawing/2014/main" id="{761B9443-38CF-0D90-A9B5-3473D15B9FBA}"/>
+              </a:ext>
+            </a:extLst>
+          </p:cNvPr>
+          <p:cNvSpPr/>
           <p:nvPr/>
-        </p:nvCxnSpPr>
-        <p:spPr bwMode="auto">
-          <a:xfrm flipV="1">
-            <a:off x="4519098" y="1623409"/>
-            <a:ext cx="0" cy="1313278"/>
-          </a:xfrm>
-          <a:prstGeom prst="straightConnector1">
-            <a:avLst/>
-          </a:prstGeom>
-          <a:solidFill>
-            <a:srgbClr val="00B8FF"/>
-          </a:solidFill>
-          <a:ln w="25400" cap="flat" cmpd="sng" algn="ctr">
-            <a:solidFill>
-              <a:schemeClr val="tx2"/>
-            </a:solidFill>
-            <a:prstDash val="solid"/>
-            <a:round/>
-            <a:headEnd type="none" w="med" len="med"/>
-            <a:tailEnd type="arrow"/>
-          </a:ln>
-          <a:effectLst/>
-          <a:extLst>
-            <a:ext uri="{AF507438-7753-43e0-B8FC-AC1667EBCBE1}">
-              <a14:hiddenEffects xmlns:a14="http://schemas.microsoft.com/office/drawing/2010/main" xmlns="">
-                <a:effectLst>
-                  <a:outerShdw dist="35921" dir="2700000" algn="ctr" rotWithShape="0">
-                    <a:schemeClr val="bg2"/>
-                  </a:outerShdw>
-                </a:effectLst>
-              </a14:hiddenEffects>
-            </a:ext>
-          </a:extLst>
-        </p:spPr>
-      </p:cxnSp>
-      <p:cxnSp>
-        <p:nvCxnSpPr>
-          <p:cNvPr id="7" name="Straight Arrow Connector 14">
-            <a:extLst>
-              <a:ext uri="{FF2B5EF4-FFF2-40B4-BE49-F238E27FC236}">
-                <a16:creationId xmlns:a16="http://schemas.microsoft.com/office/drawing/2014/main" id="{6DFA526A-ADCB-24F6-DCEB-22B273BFBE52}"/>
-              </a:ext>
-            </a:extLst>
-          </p:cNvPr>
-          <p:cNvCxnSpPr>
-            <a:cxnSpLocks/>
-          </p:cNvCxnSpPr>
-          <p:nvPr/>
-        </p:nvCxnSpPr>
+        </p:nvSpPr>
         <p:spPr bwMode="auto">
           <a:xfrm>
-            <a:off x="7471426" y="1623409"/>
-            <a:ext cx="0" cy="1313278"/>
-          </a:xfrm>
-          <a:prstGeom prst="straightConnector1">
-            <a:avLst/>
-          </a:prstGeom>
-          <a:solidFill>
-            <a:srgbClr val="00B8FF"/>
-          </a:solidFill>
-          <a:ln w="25400" cap="flat" cmpd="sng" algn="ctr">
-            <a:solidFill>
-              <a:schemeClr val="tx2"/>
-            </a:solidFill>
-            <a:prstDash val="solid"/>
-            <a:round/>
-            <a:headEnd type="none" w="med" len="med"/>
-            <a:tailEnd type="arrow"/>
-          </a:ln>
-          <a:effectLst/>
-          <a:extLst>
-            <a:ext uri="{AF507438-7753-43e0-B8FC-AC1667EBCBE1}">
-              <a14:hiddenEffects xmlns:a14="http://schemas.microsoft.com/office/drawing/2010/main" xmlns="">
-                <a:effectLst>
-                  <a:outerShdw dist="35921" dir="2700000" algn="ctr" rotWithShape="0">
-                    <a:schemeClr val="bg2"/>
-                  </a:outerShdw>
-                </a:effectLst>
-              </a14:hiddenEffects>
-            </a:ext>
-          </a:extLst>
-        </p:spPr>
-      </p:cxnSp>
-      <p:sp>
-        <p:nvSpPr>
-          <p:cNvPr id="10" name="Rectangle 9">
-            <a:extLst>
-              <a:ext uri="{FF2B5EF4-FFF2-40B4-BE49-F238E27FC236}">
-                <a16:creationId xmlns:a16="http://schemas.microsoft.com/office/drawing/2014/main" id="{4B0DB749-F556-DA2A-2BBB-06145B53FE13}"/>
-              </a:ext>
-            </a:extLst>
-          </p:cNvPr>
-          <p:cNvSpPr/>
-          <p:nvPr/>
-        </p:nvSpPr>
-        <p:spPr bwMode="auto">
-          <a:xfrm>
-            <a:off x="2286850" y="2936687"/>
+            <a:off x="7327410" y="2936687"/>
             <a:ext cx="2448272" cy="792088"/>
           </a:xfrm>
           <a:prstGeom prst="rect">
@@ -3521,18 +3429,22 @@
           <a:p>
             <a:pPr algn="ctr"/>
             <a:r>
-              <a:rPr lang="fr-FR" sz="2400" dirty="0"/>
-              <a:t>Pilotage</a:t>
+              <a:rPr lang="fr-FR" sz="2400" dirty="0">
+                <a:solidFill>
+                  <a:schemeClr val="lt1"/>
+                </a:solidFill>
+              </a:rPr>
+              <a:t>S.I.</a:t>
             </a:r>
           </a:p>
         </p:txBody>
       </p:sp>
       <p:cxnSp>
         <p:nvCxnSpPr>
-          <p:cNvPr id="12" name="Straight Arrow Connector 17">
-            <a:extLst>
-              <a:ext uri="{FF2B5EF4-FFF2-40B4-BE49-F238E27FC236}">
-                <a16:creationId xmlns:a16="http://schemas.microsoft.com/office/drawing/2014/main" id="{0C379FC2-1A73-56FC-11C1-344BCF3BDCC9}"/>
+          <p:cNvPr id="4" name="Straight Arrow Connector 3">
+            <a:extLst>
+              <a:ext uri="{FF2B5EF4-FFF2-40B4-BE49-F238E27FC236}">
+                <a16:creationId xmlns:a16="http://schemas.microsoft.com/office/drawing/2014/main" id="{7F745A67-579B-41E4-CD3E-9F59AA81811E}"/>
               </a:ext>
             </a:extLst>
           </p:cNvPr>
@@ -3542,9 +3454,9 @@
           <p:nvPr/>
         </p:nvCxnSpPr>
         <p:spPr bwMode="auto">
-          <a:xfrm>
-            <a:off x="4231066" y="3728775"/>
-            <a:ext cx="0" cy="1996434"/>
+          <a:xfrm flipV="1">
+            <a:off x="4519098" y="1623409"/>
+            <a:ext cx="0" cy="1313278"/>
           </a:xfrm>
           <a:prstGeom prst="straightConnector1">
             <a:avLst/>
@@ -3564,7 +3476,7 @@
           <a:effectLst/>
           <a:extLst>
             <a:ext uri="{AF507438-7753-43e0-B8FC-AC1667EBCBE1}">
-              <a14:hiddenEffects xmlns:a14="http://schemas.microsoft.com/office/drawing/2010/main" xmlns="">
+              <a14:hiddenEffects xmlns="" xmlns:a14="http://schemas.microsoft.com/office/drawing/2010/main">
                 <a:effectLst>
                   <a:outerShdw dist="35921" dir="2700000" algn="ctr" rotWithShape="0">
                     <a:schemeClr val="bg2"/>
@@ -3577,10 +3489,10 @@
       </p:cxnSp>
       <p:cxnSp>
         <p:nvCxnSpPr>
-          <p:cNvPr id="15" name="Straight Arrow Connector 19">
-            <a:extLst>
-              <a:ext uri="{FF2B5EF4-FFF2-40B4-BE49-F238E27FC236}">
-                <a16:creationId xmlns:a16="http://schemas.microsoft.com/office/drawing/2014/main" id="{9125E6AA-49B8-BC03-5993-8F0B31FE7D9F}"/>
+          <p:cNvPr id="7" name="Straight Arrow Connector 14">
+            <a:extLst>
+              <a:ext uri="{FF2B5EF4-FFF2-40B4-BE49-F238E27FC236}">
+                <a16:creationId xmlns:a16="http://schemas.microsoft.com/office/drawing/2014/main" id="{6DFA526A-ADCB-24F6-DCEB-22B273BFBE52}"/>
               </a:ext>
             </a:extLst>
           </p:cNvPr>
@@ -3590,9 +3502,9 @@
           <p:nvPr/>
         </p:nvCxnSpPr>
         <p:spPr bwMode="auto">
-          <a:xfrm flipV="1">
-            <a:off x="7670682" y="3728775"/>
-            <a:ext cx="0" cy="1996434"/>
+          <a:xfrm>
+            <a:off x="7471426" y="1623409"/>
+            <a:ext cx="0" cy="1313278"/>
           </a:xfrm>
           <a:prstGeom prst="straightConnector1">
             <a:avLst/>
@@ -3612,7 +3524,7 @@
           <a:effectLst/>
           <a:extLst>
             <a:ext uri="{AF507438-7753-43e0-B8FC-AC1667EBCBE1}">
-              <a14:hiddenEffects xmlns:a14="http://schemas.microsoft.com/office/drawing/2010/main" xmlns="">
+              <a14:hiddenEffects xmlns="" xmlns:a14="http://schemas.microsoft.com/office/drawing/2010/main">
                 <a:effectLst>
                   <a:outerShdw dist="35921" dir="2700000" algn="ctr" rotWithShape="0">
                     <a:schemeClr val="bg2"/>
@@ -3623,120 +3535,28 @@
           </a:extLst>
         </p:spPr>
       </p:cxnSp>
-      <p:cxnSp>
-        <p:nvCxnSpPr>
-          <p:cNvPr id="18" name="Straight Arrow Connector 26">
-            <a:extLst>
-              <a:ext uri="{FF2B5EF4-FFF2-40B4-BE49-F238E27FC236}">
-                <a16:creationId xmlns:a16="http://schemas.microsoft.com/office/drawing/2014/main" id="{EF169E77-6389-170C-77DC-557A11159329}"/>
-              </a:ext>
-            </a:extLst>
-          </p:cNvPr>
-          <p:cNvCxnSpPr/>
+      <p:sp>
+        <p:nvSpPr>
+          <p:cNvPr id="10" name="Rectangle 9">
+            <a:extLst>
+              <a:ext uri="{FF2B5EF4-FFF2-40B4-BE49-F238E27FC236}">
+                <a16:creationId xmlns:a16="http://schemas.microsoft.com/office/drawing/2014/main" id="{4B0DB749-F556-DA2A-2BBB-06145B53FE13}"/>
+              </a:ext>
+            </a:extLst>
+          </p:cNvPr>
+          <p:cNvSpPr/>
           <p:nvPr/>
-        </p:nvCxnSpPr>
-        <p:spPr bwMode="auto">
-          <a:xfrm flipH="1">
-            <a:off x="4735122" y="3008695"/>
-            <a:ext cx="2592288" cy="0"/>
-          </a:xfrm>
-          <a:prstGeom prst="straightConnector1">
-            <a:avLst/>
-          </a:prstGeom>
-          <a:solidFill>
-            <a:srgbClr val="00B8FF"/>
-          </a:solidFill>
-          <a:ln w="25400" cap="flat" cmpd="sng" algn="ctr">
-            <a:solidFill>
-              <a:schemeClr val="tx2"/>
-            </a:solidFill>
-            <a:prstDash val="solid"/>
-            <a:round/>
-            <a:headEnd type="none" w="med" len="med"/>
-            <a:tailEnd type="arrow"/>
-          </a:ln>
-          <a:effectLst/>
-          <a:extLst>
-            <a:ext uri="{AF507438-7753-43e0-B8FC-AC1667EBCBE1}">
-              <a14:hiddenEffects xmlns:a14="http://schemas.microsoft.com/office/drawing/2010/main" xmlns="">
-                <a:effectLst>
-                  <a:outerShdw dist="35921" dir="2700000" algn="ctr" rotWithShape="0">
-                    <a:schemeClr val="bg2"/>
-                  </a:outerShdw>
-                </a:effectLst>
-              </a14:hiddenEffects>
-            </a:ext>
-          </a:extLst>
-        </p:spPr>
-      </p:cxnSp>
-      <p:cxnSp>
-        <p:nvCxnSpPr>
-          <p:cNvPr id="21" name="Straight Arrow Connector 29">
-            <a:extLst>
-              <a:ext uri="{FF2B5EF4-FFF2-40B4-BE49-F238E27FC236}">
-                <a16:creationId xmlns:a16="http://schemas.microsoft.com/office/drawing/2014/main" id="{2B6D812B-4818-8FC8-B64F-41472CC5D2D4}"/>
-              </a:ext>
-            </a:extLst>
-          </p:cNvPr>
-          <p:cNvCxnSpPr/>
-          <p:nvPr/>
-        </p:nvCxnSpPr>
+        </p:nvSpPr>
         <p:spPr bwMode="auto">
           <a:xfrm>
-            <a:off x="4735122" y="3728775"/>
-            <a:ext cx="2592288" cy="0"/>
-          </a:xfrm>
-          <a:prstGeom prst="straightConnector1">
-            <a:avLst/>
-          </a:prstGeom>
-          <a:solidFill>
-            <a:srgbClr val="00B8FF"/>
-          </a:solidFill>
-          <a:ln w="25400" cap="flat" cmpd="sng" algn="ctr">
-            <a:solidFill>
-              <a:schemeClr val="tx2"/>
-            </a:solidFill>
-            <a:prstDash val="solid"/>
-            <a:round/>
-            <a:headEnd type="none" w="med" len="med"/>
-            <a:tailEnd type="arrow"/>
-          </a:ln>
-          <a:effectLst/>
-          <a:extLst>
-            <a:ext uri="{AF507438-7753-43e0-B8FC-AC1667EBCBE1}">
-              <a14:hiddenEffects xmlns:a14="http://schemas.microsoft.com/office/drawing/2010/main" xmlns="">
-                <a:effectLst>
-                  <a:outerShdw dist="35921" dir="2700000" algn="ctr" rotWithShape="0">
-                    <a:schemeClr val="bg2"/>
-                  </a:outerShdw>
-                </a:effectLst>
-              </a14:hiddenEffects>
-            </a:ext>
-          </a:extLst>
-        </p:spPr>
-      </p:cxnSp>
-      <p:sp>
-        <p:nvSpPr>
-          <p:cNvPr id="24" name="Rectangle 23">
-            <a:extLst>
-              <a:ext uri="{FF2B5EF4-FFF2-40B4-BE49-F238E27FC236}">
-                <a16:creationId xmlns:a16="http://schemas.microsoft.com/office/drawing/2014/main" id="{7263E808-C6AA-5A4C-3FA6-923B60D09384}"/>
-              </a:ext>
-            </a:extLst>
-          </p:cNvPr>
-          <p:cNvSpPr/>
-          <p:nvPr/>
-        </p:nvSpPr>
-        <p:spPr bwMode="auto">
-          <a:xfrm>
-            <a:off x="1760705" y="397116"/>
-            <a:ext cx="8764621" cy="1226293"/>
+            <a:off x="2286850" y="2936687"/>
+            <a:ext cx="2448272" cy="792088"/>
           </a:xfrm>
           <a:prstGeom prst="rect">
             <a:avLst/>
           </a:prstGeom>
           <a:solidFill>
-            <a:srgbClr val="4E81BD"/>
+            <a:srgbClr val="4BACC7"/>
           </a:solidFill>
         </p:spPr>
         <p:style>
@@ -3754,6 +3574,244 @@
           </a:fontRef>
         </p:style>
         <p:txBody>
+          <a:bodyPr rtlCol="0" anchor="ctr"/>
+          <a:lstStyle/>
+          <a:p>
+            <a:pPr algn="ctr"/>
+            <a:r>
+              <a:rPr lang="fr-FR" sz="2400" dirty="0"/>
+              <a:t>Pilotage</a:t>
+            </a:r>
+          </a:p>
+        </p:txBody>
+      </p:sp>
+      <p:cxnSp>
+        <p:nvCxnSpPr>
+          <p:cNvPr id="12" name="Straight Arrow Connector 17">
+            <a:extLst>
+              <a:ext uri="{FF2B5EF4-FFF2-40B4-BE49-F238E27FC236}">
+                <a16:creationId xmlns:a16="http://schemas.microsoft.com/office/drawing/2014/main" id="{0C379FC2-1A73-56FC-11C1-344BCF3BDCC9}"/>
+              </a:ext>
+            </a:extLst>
+          </p:cNvPr>
+          <p:cNvCxnSpPr>
+            <a:cxnSpLocks/>
+          </p:cNvCxnSpPr>
+          <p:nvPr/>
+        </p:nvCxnSpPr>
+        <p:spPr bwMode="auto">
+          <a:xfrm>
+            <a:off x="4231066" y="3728775"/>
+            <a:ext cx="0" cy="1996434"/>
+          </a:xfrm>
+          <a:prstGeom prst="straightConnector1">
+            <a:avLst/>
+          </a:prstGeom>
+          <a:solidFill>
+            <a:srgbClr val="00B8FF"/>
+          </a:solidFill>
+          <a:ln w="25400" cap="flat" cmpd="sng" algn="ctr">
+            <a:solidFill>
+              <a:schemeClr val="tx2"/>
+            </a:solidFill>
+            <a:prstDash val="solid"/>
+            <a:round/>
+            <a:headEnd type="none" w="med" len="med"/>
+            <a:tailEnd type="arrow"/>
+          </a:ln>
+          <a:effectLst/>
+          <a:extLst>
+            <a:ext uri="{AF507438-7753-43e0-B8FC-AC1667EBCBE1}">
+              <a14:hiddenEffects xmlns="" xmlns:a14="http://schemas.microsoft.com/office/drawing/2010/main">
+                <a:effectLst>
+                  <a:outerShdw dist="35921" dir="2700000" algn="ctr" rotWithShape="0">
+                    <a:schemeClr val="bg2"/>
+                  </a:outerShdw>
+                </a:effectLst>
+              </a14:hiddenEffects>
+            </a:ext>
+          </a:extLst>
+        </p:spPr>
+      </p:cxnSp>
+      <p:cxnSp>
+        <p:nvCxnSpPr>
+          <p:cNvPr id="15" name="Straight Arrow Connector 19">
+            <a:extLst>
+              <a:ext uri="{FF2B5EF4-FFF2-40B4-BE49-F238E27FC236}">
+                <a16:creationId xmlns:a16="http://schemas.microsoft.com/office/drawing/2014/main" id="{9125E6AA-49B8-BC03-5993-8F0B31FE7D9F}"/>
+              </a:ext>
+            </a:extLst>
+          </p:cNvPr>
+          <p:cNvCxnSpPr>
+            <a:cxnSpLocks/>
+          </p:cNvCxnSpPr>
+          <p:nvPr/>
+        </p:nvCxnSpPr>
+        <p:spPr bwMode="auto">
+          <a:xfrm flipV="1">
+            <a:off x="7670682" y="3728775"/>
+            <a:ext cx="0" cy="1996434"/>
+          </a:xfrm>
+          <a:prstGeom prst="straightConnector1">
+            <a:avLst/>
+          </a:prstGeom>
+          <a:solidFill>
+            <a:srgbClr val="00B8FF"/>
+          </a:solidFill>
+          <a:ln w="25400" cap="flat" cmpd="sng" algn="ctr">
+            <a:solidFill>
+              <a:schemeClr val="tx2"/>
+            </a:solidFill>
+            <a:prstDash val="solid"/>
+            <a:round/>
+            <a:headEnd type="none" w="med" len="med"/>
+            <a:tailEnd type="arrow"/>
+          </a:ln>
+          <a:effectLst/>
+          <a:extLst>
+            <a:ext uri="{AF507438-7753-43e0-B8FC-AC1667EBCBE1}">
+              <a14:hiddenEffects xmlns="" xmlns:a14="http://schemas.microsoft.com/office/drawing/2010/main">
+                <a:effectLst>
+                  <a:outerShdw dist="35921" dir="2700000" algn="ctr" rotWithShape="0">
+                    <a:schemeClr val="bg2"/>
+                  </a:outerShdw>
+                </a:effectLst>
+              </a14:hiddenEffects>
+            </a:ext>
+          </a:extLst>
+        </p:spPr>
+      </p:cxnSp>
+      <p:cxnSp>
+        <p:nvCxnSpPr>
+          <p:cNvPr id="18" name="Straight Arrow Connector 26">
+            <a:extLst>
+              <a:ext uri="{FF2B5EF4-FFF2-40B4-BE49-F238E27FC236}">
+                <a16:creationId xmlns:a16="http://schemas.microsoft.com/office/drawing/2014/main" id="{EF169E77-6389-170C-77DC-557A11159329}"/>
+              </a:ext>
+            </a:extLst>
+          </p:cNvPr>
+          <p:cNvCxnSpPr/>
+          <p:nvPr/>
+        </p:nvCxnSpPr>
+        <p:spPr bwMode="auto">
+          <a:xfrm flipH="1">
+            <a:off x="4735122" y="3008695"/>
+            <a:ext cx="2592288" cy="0"/>
+          </a:xfrm>
+          <a:prstGeom prst="straightConnector1">
+            <a:avLst/>
+          </a:prstGeom>
+          <a:solidFill>
+            <a:srgbClr val="00B8FF"/>
+          </a:solidFill>
+          <a:ln w="25400" cap="flat" cmpd="sng" algn="ctr">
+            <a:solidFill>
+              <a:schemeClr val="tx2"/>
+            </a:solidFill>
+            <a:prstDash val="solid"/>
+            <a:round/>
+            <a:headEnd type="none" w="med" len="med"/>
+            <a:tailEnd type="arrow"/>
+          </a:ln>
+          <a:effectLst/>
+          <a:extLst>
+            <a:ext uri="{AF507438-7753-43e0-B8FC-AC1667EBCBE1}">
+              <a14:hiddenEffects xmlns="" xmlns:a14="http://schemas.microsoft.com/office/drawing/2010/main">
+                <a:effectLst>
+                  <a:outerShdw dist="35921" dir="2700000" algn="ctr" rotWithShape="0">
+                    <a:schemeClr val="bg2"/>
+                  </a:outerShdw>
+                </a:effectLst>
+              </a14:hiddenEffects>
+            </a:ext>
+          </a:extLst>
+        </p:spPr>
+      </p:cxnSp>
+      <p:cxnSp>
+        <p:nvCxnSpPr>
+          <p:cNvPr id="21" name="Straight Arrow Connector 29">
+            <a:extLst>
+              <a:ext uri="{FF2B5EF4-FFF2-40B4-BE49-F238E27FC236}">
+                <a16:creationId xmlns:a16="http://schemas.microsoft.com/office/drawing/2014/main" id="{2B6D812B-4818-8FC8-B64F-41472CC5D2D4}"/>
+              </a:ext>
+            </a:extLst>
+          </p:cNvPr>
+          <p:cNvCxnSpPr/>
+          <p:nvPr/>
+        </p:nvCxnSpPr>
+        <p:spPr bwMode="auto">
+          <a:xfrm>
+            <a:off x="4735122" y="3728775"/>
+            <a:ext cx="2592288" cy="0"/>
+          </a:xfrm>
+          <a:prstGeom prst="straightConnector1">
+            <a:avLst/>
+          </a:prstGeom>
+          <a:solidFill>
+            <a:srgbClr val="00B8FF"/>
+          </a:solidFill>
+          <a:ln w="25400" cap="flat" cmpd="sng" algn="ctr">
+            <a:solidFill>
+              <a:schemeClr val="tx2"/>
+            </a:solidFill>
+            <a:prstDash val="solid"/>
+            <a:round/>
+            <a:headEnd type="none" w="med" len="med"/>
+            <a:tailEnd type="arrow"/>
+          </a:ln>
+          <a:effectLst/>
+          <a:extLst>
+            <a:ext uri="{AF507438-7753-43e0-B8FC-AC1667EBCBE1}">
+              <a14:hiddenEffects xmlns="" xmlns:a14="http://schemas.microsoft.com/office/drawing/2010/main">
+                <a:effectLst>
+                  <a:outerShdw dist="35921" dir="2700000" algn="ctr" rotWithShape="0">
+                    <a:schemeClr val="bg2"/>
+                  </a:outerShdw>
+                </a:effectLst>
+              </a14:hiddenEffects>
+            </a:ext>
+          </a:extLst>
+        </p:spPr>
+      </p:cxnSp>
+      <p:sp>
+        <p:nvSpPr>
+          <p:cNvPr id="24" name="Rectangle 23">
+            <a:extLst>
+              <a:ext uri="{FF2B5EF4-FFF2-40B4-BE49-F238E27FC236}">
+                <a16:creationId xmlns:a16="http://schemas.microsoft.com/office/drawing/2014/main" id="{7263E808-C6AA-5A4C-3FA6-923B60D09384}"/>
+              </a:ext>
+            </a:extLst>
+          </p:cNvPr>
+          <p:cNvSpPr/>
+          <p:nvPr/>
+        </p:nvSpPr>
+        <p:spPr bwMode="auto">
+          <a:xfrm>
+            <a:off x="0" y="0"/>
+            <a:ext cx="12191999" cy="1623409"/>
+          </a:xfrm>
+          <a:prstGeom prst="rect">
+            <a:avLst/>
+          </a:prstGeom>
+          <a:solidFill>
+            <a:srgbClr val="4E81BD"/>
+          </a:solidFill>
+        </p:spPr>
+        <p:style>
+          <a:lnRef idx="1">
+            <a:schemeClr val="accent1"/>
+          </a:lnRef>
+          <a:fillRef idx="3">
+            <a:schemeClr val="accent1"/>
+          </a:fillRef>
+          <a:effectRef idx="2">
+            <a:schemeClr val="accent1"/>
+          </a:effectRef>
+          <a:fontRef idx="minor">
+            <a:schemeClr val="lt1"/>
+          </a:fontRef>
+        </p:style>
+        <p:txBody>
           <a:bodyPr rtlCol="0" anchor="t" anchorCtr="0"/>
           <a:lstStyle/>
           <a:p>
@@ -3810,7 +3868,7 @@
           <a:effectLst/>
           <a:extLst>
             <a:ext uri="{AF507438-7753-43e0-B8FC-AC1667EBCBE1}">
-              <a14:hiddenEffects xmlns:a14="http://schemas.microsoft.com/office/drawing/2010/main" xmlns="">
+              <a14:hiddenEffects xmlns="" xmlns:a14="http://schemas.microsoft.com/office/drawing/2010/main">
                 <a:effectLst>
                   <a:outerShdw dist="35921" dir="2700000" algn="ctr" rotWithShape="0">
                     <a:schemeClr val="bg2"/>
@@ -3862,7 +3920,7 @@
           <a:effectLst/>
           <a:extLst>
             <a:ext uri="{AF507438-7753-43e0-B8FC-AC1667EBCBE1}">
-              <a14:hiddenEffects xmlns:a14="http://schemas.microsoft.com/office/drawing/2010/main" xmlns="">
+              <a14:hiddenEffects xmlns="" xmlns:a14="http://schemas.microsoft.com/office/drawing/2010/main">
                 <a:effectLst>
                   <a:outerShdw dist="35921" dir="2700000" algn="ctr" rotWithShape="0">
                     <a:schemeClr val="bg2"/>
@@ -4085,61 +4143,6 @@
       </p:sp>
       <p:sp>
         <p:nvSpPr>
-          <p:cNvPr id="62" name="Rectangle 61">
-            <a:extLst>
-              <a:ext uri="{FF2B5EF4-FFF2-40B4-BE49-F238E27FC236}">
-                <a16:creationId xmlns:a16="http://schemas.microsoft.com/office/drawing/2014/main" id="{30C7F49C-F965-1A0D-48B1-9559B6D03A21}"/>
-              </a:ext>
-            </a:extLst>
-          </p:cNvPr>
-          <p:cNvSpPr/>
-          <p:nvPr/>
-        </p:nvSpPr>
-        <p:spPr>
-          <a:xfrm>
-            <a:off x="1760706" y="2071991"/>
-            <a:ext cx="8764622" cy="4591096"/>
-          </a:xfrm>
-          <a:prstGeom prst="rect">
-            <a:avLst/>
-          </a:prstGeom>
-          <a:noFill/>
-          <a:ln>
-            <a:solidFill>
-              <a:schemeClr val="accent4">
-                <a:lumMod val="50000"/>
-              </a:schemeClr>
-            </a:solidFill>
-            <a:prstDash val="dash"/>
-          </a:ln>
-        </p:spPr>
-        <p:style>
-          <a:lnRef idx="2">
-            <a:schemeClr val="accent1">
-              <a:shade val="50000"/>
-            </a:schemeClr>
-          </a:lnRef>
-          <a:fillRef idx="1">
-            <a:schemeClr val="accent1"/>
-          </a:fillRef>
-          <a:effectRef idx="0">
-            <a:schemeClr val="accent1"/>
-          </a:effectRef>
-          <a:fontRef idx="minor">
-            <a:schemeClr val="lt1"/>
-          </a:fontRef>
-        </p:style>
-        <p:txBody>
-          <a:bodyPr rtlCol="0" anchor="ctr"/>
-          <a:lstStyle/>
-          <a:p>
-            <a:pPr algn="ctr"/>
-            <a:endParaRPr lang="fr-FR"/>
-          </a:p>
-        </p:txBody>
-      </p:sp>
-      <p:sp>
-        <p:nvSpPr>
           <p:cNvPr id="69" name="Rectangle 68">
             <a:extLst>
               <a:ext uri="{FF2B5EF4-FFF2-40B4-BE49-F238E27FC236}">
@@ -4611,7 +4614,7 @@
         </p:nvSpPr>
         <p:spPr>
           <a:xfrm>
-            <a:off x="3552991" y="1898356"/>
+            <a:off x="3682155" y="1985567"/>
             <a:ext cx="1989071" cy="582473"/>
           </a:xfrm>
           <a:prstGeom prst="rect">
@@ -4857,10 +4860,10 @@
       </p:grpSpPr>
       <p:sp>
         <p:nvSpPr>
-          <p:cNvPr id="2" name="Rectangle 1">
-            <a:extLst>
-              <a:ext uri="{FF2B5EF4-FFF2-40B4-BE49-F238E27FC236}">
-                <a16:creationId xmlns:a16="http://schemas.microsoft.com/office/drawing/2014/main" id="{761B9443-38CF-0D90-A9B5-3473D15B9FBA}"/>
+          <p:cNvPr id="3" name="Rectangle 2">
+            <a:extLst>
+              <a:ext uri="{FF2B5EF4-FFF2-40B4-BE49-F238E27FC236}">
+                <a16:creationId xmlns:a16="http://schemas.microsoft.com/office/drawing/2014/main" id="{CCCE5597-8D95-E3D1-CD28-774321259292}"/>
               </a:ext>
             </a:extLst>
           </p:cNvPr>
@@ -4869,15 +4872,21 @@
         </p:nvSpPr>
         <p:spPr bwMode="auto">
           <a:xfrm>
-            <a:off x="7327410" y="2936687"/>
-            <a:ext cx="2448272" cy="792088"/>
+            <a:off x="-15154" y="1621614"/>
+            <a:ext cx="12191999" cy="5236386"/>
           </a:xfrm>
           <a:prstGeom prst="rect">
             <a:avLst/>
           </a:prstGeom>
           <a:solidFill>
-            <a:srgbClr val="4BACC7"/>
-          </a:solidFill>
+            <a:schemeClr val="accent1">
+              <a:lumMod val="20000"/>
+              <a:lumOff val="80000"/>
+            </a:schemeClr>
+          </a:solidFill>
+          <a:ln>
+            <a:noFill/>
+          </a:ln>
         </p:spPr>
         <p:style>
           <a:lnRef idx="1">
@@ -4894,132 +4903,33 @@
           </a:fontRef>
         </p:style>
         <p:txBody>
-          <a:bodyPr rtlCol="0" anchor="ctr"/>
+          <a:bodyPr rtlCol="0" anchor="t" anchorCtr="0"/>
           <a:lstStyle/>
           <a:p>
             <a:pPr algn="ctr"/>
-            <a:r>
-              <a:rPr lang="fr-FR" sz="2400" dirty="0">
-                <a:solidFill>
-                  <a:schemeClr val="lt1"/>
-                </a:solidFill>
-              </a:rPr>
-              <a:t>S.I.</a:t>
-            </a:r>
-          </a:p>
-        </p:txBody>
-      </p:sp>
-      <p:cxnSp>
-        <p:nvCxnSpPr>
-          <p:cNvPr id="4" name="Straight Arrow Connector 3">
-            <a:extLst>
-              <a:ext uri="{FF2B5EF4-FFF2-40B4-BE49-F238E27FC236}">
-                <a16:creationId xmlns:a16="http://schemas.microsoft.com/office/drawing/2014/main" id="{7F745A67-579B-41E4-CD3E-9F59AA81811E}"/>
-              </a:ext>
-            </a:extLst>
-          </p:cNvPr>
-          <p:cNvCxnSpPr>
-            <a:cxnSpLocks/>
-          </p:cNvCxnSpPr>
+            <a:endParaRPr lang="fr-FR" sz="3200" dirty="0">
+              <a:solidFill>
+                <a:schemeClr val="lt1"/>
+              </a:solidFill>
+            </a:endParaRPr>
+          </a:p>
+        </p:txBody>
+      </p:sp>
+      <p:sp>
+        <p:nvSpPr>
+          <p:cNvPr id="2" name="Rectangle 1">
+            <a:extLst>
+              <a:ext uri="{FF2B5EF4-FFF2-40B4-BE49-F238E27FC236}">
+                <a16:creationId xmlns:a16="http://schemas.microsoft.com/office/drawing/2014/main" id="{761B9443-38CF-0D90-A9B5-3473D15B9FBA}"/>
+              </a:ext>
+            </a:extLst>
+          </p:cNvPr>
+          <p:cNvSpPr/>
           <p:nvPr/>
-        </p:nvCxnSpPr>
-        <p:spPr bwMode="auto">
-          <a:xfrm flipV="1">
-            <a:off x="4519098" y="1623409"/>
-            <a:ext cx="0" cy="1313278"/>
-          </a:xfrm>
-          <a:prstGeom prst="straightConnector1">
-            <a:avLst/>
-          </a:prstGeom>
-          <a:solidFill>
-            <a:srgbClr val="00B8FF"/>
-          </a:solidFill>
-          <a:ln w="25400" cap="flat" cmpd="sng" algn="ctr">
-            <a:solidFill>
-              <a:schemeClr val="tx2"/>
-            </a:solidFill>
-            <a:prstDash val="solid"/>
-            <a:round/>
-            <a:headEnd type="none" w="med" len="med"/>
-            <a:tailEnd type="arrow"/>
-          </a:ln>
-          <a:effectLst/>
-          <a:extLst>
-            <a:ext uri="{AF507438-7753-43e0-B8FC-AC1667EBCBE1}">
-              <a14:hiddenEffects xmlns:a14="http://schemas.microsoft.com/office/drawing/2010/main" xmlns="">
-                <a:effectLst>
-                  <a:outerShdw dist="35921" dir="2700000" algn="ctr" rotWithShape="0">
-                    <a:schemeClr val="bg2"/>
-                  </a:outerShdw>
-                </a:effectLst>
-              </a14:hiddenEffects>
-            </a:ext>
-          </a:extLst>
-        </p:spPr>
-      </p:cxnSp>
-      <p:cxnSp>
-        <p:nvCxnSpPr>
-          <p:cNvPr id="7" name="Straight Arrow Connector 14">
-            <a:extLst>
-              <a:ext uri="{FF2B5EF4-FFF2-40B4-BE49-F238E27FC236}">
-                <a16:creationId xmlns:a16="http://schemas.microsoft.com/office/drawing/2014/main" id="{6DFA526A-ADCB-24F6-DCEB-22B273BFBE52}"/>
-              </a:ext>
-            </a:extLst>
-          </p:cNvPr>
-          <p:cNvCxnSpPr>
-            <a:cxnSpLocks/>
-          </p:cNvCxnSpPr>
-          <p:nvPr/>
-        </p:nvCxnSpPr>
+        </p:nvSpPr>
         <p:spPr bwMode="auto">
           <a:xfrm>
-            <a:off x="7471426" y="1623409"/>
-            <a:ext cx="0" cy="1313278"/>
-          </a:xfrm>
-          <a:prstGeom prst="straightConnector1">
-            <a:avLst/>
-          </a:prstGeom>
-          <a:solidFill>
-            <a:srgbClr val="00B8FF"/>
-          </a:solidFill>
-          <a:ln w="25400" cap="flat" cmpd="sng" algn="ctr">
-            <a:solidFill>
-              <a:schemeClr val="tx2"/>
-            </a:solidFill>
-            <a:prstDash val="solid"/>
-            <a:round/>
-            <a:headEnd type="none" w="med" len="med"/>
-            <a:tailEnd type="arrow"/>
-          </a:ln>
-          <a:effectLst/>
-          <a:extLst>
-            <a:ext uri="{AF507438-7753-43e0-B8FC-AC1667EBCBE1}">
-              <a14:hiddenEffects xmlns:a14="http://schemas.microsoft.com/office/drawing/2010/main" xmlns="">
-                <a:effectLst>
-                  <a:outerShdw dist="35921" dir="2700000" algn="ctr" rotWithShape="0">
-                    <a:schemeClr val="bg2"/>
-                  </a:outerShdw>
-                </a:effectLst>
-              </a14:hiddenEffects>
-            </a:ext>
-          </a:extLst>
-        </p:spPr>
-      </p:cxnSp>
-      <p:sp>
-        <p:nvSpPr>
-          <p:cNvPr id="10" name="Rectangle 9">
-            <a:extLst>
-              <a:ext uri="{FF2B5EF4-FFF2-40B4-BE49-F238E27FC236}">
-                <a16:creationId xmlns:a16="http://schemas.microsoft.com/office/drawing/2014/main" id="{4B0DB749-F556-DA2A-2BBB-06145B53FE13}"/>
-              </a:ext>
-            </a:extLst>
-          </p:cNvPr>
-          <p:cNvSpPr/>
-          <p:nvPr/>
-        </p:nvSpPr>
-        <p:spPr bwMode="auto">
-          <a:xfrm>
-            <a:off x="2286850" y="2936687"/>
+            <a:off x="7327410" y="2936687"/>
             <a:ext cx="2448272" cy="792088"/>
           </a:xfrm>
           <a:prstGeom prst="rect">
@@ -5049,18 +4959,22 @@
           <a:p>
             <a:pPr algn="ctr"/>
             <a:r>
-              <a:rPr lang="fr-FR" sz="2400" dirty="0"/>
-              <a:t>Pilotage</a:t>
+              <a:rPr lang="fr-FR" sz="2400" dirty="0">
+                <a:solidFill>
+                  <a:schemeClr val="lt1"/>
+                </a:solidFill>
+              </a:rPr>
+              <a:t>S.I.</a:t>
             </a:r>
           </a:p>
         </p:txBody>
       </p:sp>
       <p:cxnSp>
         <p:nvCxnSpPr>
-          <p:cNvPr id="12" name="Straight Arrow Connector 17">
-            <a:extLst>
-              <a:ext uri="{FF2B5EF4-FFF2-40B4-BE49-F238E27FC236}">
-                <a16:creationId xmlns:a16="http://schemas.microsoft.com/office/drawing/2014/main" id="{0C379FC2-1A73-56FC-11C1-344BCF3BDCC9}"/>
+          <p:cNvPr id="4" name="Straight Arrow Connector 3">
+            <a:extLst>
+              <a:ext uri="{FF2B5EF4-FFF2-40B4-BE49-F238E27FC236}">
+                <a16:creationId xmlns:a16="http://schemas.microsoft.com/office/drawing/2014/main" id="{7F745A67-579B-41E4-CD3E-9F59AA81811E}"/>
               </a:ext>
             </a:extLst>
           </p:cNvPr>
@@ -5070,9 +4984,9 @@
           <p:nvPr/>
         </p:nvCxnSpPr>
         <p:spPr bwMode="auto">
-          <a:xfrm>
-            <a:off x="4231066" y="3728775"/>
-            <a:ext cx="0" cy="1996434"/>
+          <a:xfrm flipV="1">
+            <a:off x="4519098" y="1623409"/>
+            <a:ext cx="0" cy="1313278"/>
           </a:xfrm>
           <a:prstGeom prst="straightConnector1">
             <a:avLst/>
@@ -5092,7 +5006,7 @@
           <a:effectLst/>
           <a:extLst>
             <a:ext uri="{AF507438-7753-43e0-B8FC-AC1667EBCBE1}">
-              <a14:hiddenEffects xmlns:a14="http://schemas.microsoft.com/office/drawing/2010/main" xmlns="">
+              <a14:hiddenEffects xmlns="" xmlns:a14="http://schemas.microsoft.com/office/drawing/2010/main">
                 <a:effectLst>
                   <a:outerShdw dist="35921" dir="2700000" algn="ctr" rotWithShape="0">
                     <a:schemeClr val="bg2"/>
@@ -5105,10 +5019,10 @@
       </p:cxnSp>
       <p:cxnSp>
         <p:nvCxnSpPr>
-          <p:cNvPr id="15" name="Straight Arrow Connector 19">
-            <a:extLst>
-              <a:ext uri="{FF2B5EF4-FFF2-40B4-BE49-F238E27FC236}">
-                <a16:creationId xmlns:a16="http://schemas.microsoft.com/office/drawing/2014/main" id="{9125E6AA-49B8-BC03-5993-8F0B31FE7D9F}"/>
+          <p:cNvPr id="7" name="Straight Arrow Connector 14">
+            <a:extLst>
+              <a:ext uri="{FF2B5EF4-FFF2-40B4-BE49-F238E27FC236}">
+                <a16:creationId xmlns:a16="http://schemas.microsoft.com/office/drawing/2014/main" id="{6DFA526A-ADCB-24F6-DCEB-22B273BFBE52}"/>
               </a:ext>
             </a:extLst>
           </p:cNvPr>
@@ -5118,9 +5032,9 @@
           <p:nvPr/>
         </p:nvCxnSpPr>
         <p:spPr bwMode="auto">
-          <a:xfrm flipV="1">
-            <a:off x="7670682" y="3728775"/>
-            <a:ext cx="0" cy="1996434"/>
+          <a:xfrm>
+            <a:off x="7471426" y="1623409"/>
+            <a:ext cx="0" cy="1313278"/>
           </a:xfrm>
           <a:prstGeom prst="straightConnector1">
             <a:avLst/>
@@ -5140,7 +5054,7 @@
           <a:effectLst/>
           <a:extLst>
             <a:ext uri="{AF507438-7753-43e0-B8FC-AC1667EBCBE1}">
-              <a14:hiddenEffects xmlns:a14="http://schemas.microsoft.com/office/drawing/2010/main" xmlns="">
+              <a14:hiddenEffects xmlns="" xmlns:a14="http://schemas.microsoft.com/office/drawing/2010/main">
                 <a:effectLst>
                   <a:outerShdw dist="35921" dir="2700000" algn="ctr" rotWithShape="0">
                     <a:schemeClr val="bg2"/>
@@ -5151,120 +5065,28 @@
           </a:extLst>
         </p:spPr>
       </p:cxnSp>
-      <p:cxnSp>
-        <p:nvCxnSpPr>
-          <p:cNvPr id="18" name="Straight Arrow Connector 26">
-            <a:extLst>
-              <a:ext uri="{FF2B5EF4-FFF2-40B4-BE49-F238E27FC236}">
-                <a16:creationId xmlns:a16="http://schemas.microsoft.com/office/drawing/2014/main" id="{EF169E77-6389-170C-77DC-557A11159329}"/>
-              </a:ext>
-            </a:extLst>
-          </p:cNvPr>
-          <p:cNvCxnSpPr/>
+      <p:sp>
+        <p:nvSpPr>
+          <p:cNvPr id="10" name="Rectangle 9">
+            <a:extLst>
+              <a:ext uri="{FF2B5EF4-FFF2-40B4-BE49-F238E27FC236}">
+                <a16:creationId xmlns:a16="http://schemas.microsoft.com/office/drawing/2014/main" id="{4B0DB749-F556-DA2A-2BBB-06145B53FE13}"/>
+              </a:ext>
+            </a:extLst>
+          </p:cNvPr>
+          <p:cNvSpPr/>
           <p:nvPr/>
-        </p:nvCxnSpPr>
-        <p:spPr bwMode="auto">
-          <a:xfrm flipH="1">
-            <a:off x="4735122" y="3008695"/>
-            <a:ext cx="2592288" cy="0"/>
-          </a:xfrm>
-          <a:prstGeom prst="straightConnector1">
-            <a:avLst/>
-          </a:prstGeom>
-          <a:solidFill>
-            <a:srgbClr val="00B8FF"/>
-          </a:solidFill>
-          <a:ln w="25400" cap="flat" cmpd="sng" algn="ctr">
-            <a:solidFill>
-              <a:schemeClr val="tx2"/>
-            </a:solidFill>
-            <a:prstDash val="solid"/>
-            <a:round/>
-            <a:headEnd type="none" w="med" len="med"/>
-            <a:tailEnd type="arrow"/>
-          </a:ln>
-          <a:effectLst/>
-          <a:extLst>
-            <a:ext uri="{AF507438-7753-43e0-B8FC-AC1667EBCBE1}">
-              <a14:hiddenEffects xmlns:a14="http://schemas.microsoft.com/office/drawing/2010/main" xmlns="">
-                <a:effectLst>
-                  <a:outerShdw dist="35921" dir="2700000" algn="ctr" rotWithShape="0">
-                    <a:schemeClr val="bg2"/>
-                  </a:outerShdw>
-                </a:effectLst>
-              </a14:hiddenEffects>
-            </a:ext>
-          </a:extLst>
-        </p:spPr>
-      </p:cxnSp>
-      <p:cxnSp>
-        <p:nvCxnSpPr>
-          <p:cNvPr id="21" name="Straight Arrow Connector 29">
-            <a:extLst>
-              <a:ext uri="{FF2B5EF4-FFF2-40B4-BE49-F238E27FC236}">
-                <a16:creationId xmlns:a16="http://schemas.microsoft.com/office/drawing/2014/main" id="{2B6D812B-4818-8FC8-B64F-41472CC5D2D4}"/>
-              </a:ext>
-            </a:extLst>
-          </p:cNvPr>
-          <p:cNvCxnSpPr/>
-          <p:nvPr/>
-        </p:nvCxnSpPr>
+        </p:nvSpPr>
         <p:spPr bwMode="auto">
           <a:xfrm>
-            <a:off x="4735122" y="3728775"/>
-            <a:ext cx="2592288" cy="0"/>
-          </a:xfrm>
-          <a:prstGeom prst="straightConnector1">
-            <a:avLst/>
-          </a:prstGeom>
-          <a:solidFill>
-            <a:srgbClr val="00B8FF"/>
-          </a:solidFill>
-          <a:ln w="25400" cap="flat" cmpd="sng" algn="ctr">
-            <a:solidFill>
-              <a:schemeClr val="tx2"/>
-            </a:solidFill>
-            <a:prstDash val="solid"/>
-            <a:round/>
-            <a:headEnd type="none" w="med" len="med"/>
-            <a:tailEnd type="arrow"/>
-          </a:ln>
-          <a:effectLst/>
-          <a:extLst>
-            <a:ext uri="{AF507438-7753-43e0-B8FC-AC1667EBCBE1}">
-              <a14:hiddenEffects xmlns:a14="http://schemas.microsoft.com/office/drawing/2010/main" xmlns="">
-                <a:effectLst>
-                  <a:outerShdw dist="35921" dir="2700000" algn="ctr" rotWithShape="0">
-                    <a:schemeClr val="bg2"/>
-                  </a:outerShdw>
-                </a:effectLst>
-              </a14:hiddenEffects>
-            </a:ext>
-          </a:extLst>
-        </p:spPr>
-      </p:cxnSp>
-      <p:sp>
-        <p:nvSpPr>
-          <p:cNvPr id="24" name="Rectangle 23">
-            <a:extLst>
-              <a:ext uri="{FF2B5EF4-FFF2-40B4-BE49-F238E27FC236}">
-                <a16:creationId xmlns:a16="http://schemas.microsoft.com/office/drawing/2014/main" id="{7263E808-C6AA-5A4C-3FA6-923B60D09384}"/>
-              </a:ext>
-            </a:extLst>
-          </p:cNvPr>
-          <p:cNvSpPr/>
-          <p:nvPr/>
-        </p:nvSpPr>
-        <p:spPr bwMode="auto">
-          <a:xfrm>
-            <a:off x="1760705" y="397116"/>
-            <a:ext cx="8764621" cy="1226293"/>
+            <a:off x="2286850" y="2936687"/>
+            <a:ext cx="2448272" cy="792088"/>
           </a:xfrm>
           <a:prstGeom prst="rect">
             <a:avLst/>
           </a:prstGeom>
           <a:solidFill>
-            <a:srgbClr val="4E81BD"/>
+            <a:srgbClr val="4BACC7"/>
           </a:solidFill>
         </p:spPr>
         <p:style>
@@ -5282,98 +5104,38 @@
           </a:fontRef>
         </p:style>
         <p:txBody>
-          <a:bodyPr rtlCol="0" anchor="t" anchorCtr="0"/>
+          <a:bodyPr rtlCol="0" anchor="ctr"/>
           <a:lstStyle/>
           <a:p>
             <a:pPr algn="ctr"/>
             <a:r>
-              <a:rPr lang="fr-FR" sz="3200" dirty="0">
-                <a:solidFill>
-                  <a:schemeClr val="lt1"/>
-                </a:solidFill>
-              </a:rPr>
-              <a:t>Environnement</a:t>
+              <a:rPr lang="fr-FR" sz="2400" dirty="0"/>
+              <a:t>Pilotage</a:t>
             </a:r>
           </a:p>
         </p:txBody>
       </p:sp>
       <p:cxnSp>
         <p:nvCxnSpPr>
-          <p:cNvPr id="25" name="Elbow Connector 21">
-            <a:extLst>
-              <a:ext uri="{FF2B5EF4-FFF2-40B4-BE49-F238E27FC236}">
-                <a16:creationId xmlns:a16="http://schemas.microsoft.com/office/drawing/2014/main" id="{F51DF801-ED9C-5D0C-14A6-C518D8BBBA9B}"/>
+          <p:cNvPr id="12" name="Straight Arrow Connector 17">
+            <a:extLst>
+              <a:ext uri="{FF2B5EF4-FFF2-40B4-BE49-F238E27FC236}">
+                <a16:creationId xmlns:a16="http://schemas.microsoft.com/office/drawing/2014/main" id="{0C379FC2-1A73-56FC-11C1-344BCF3BDCC9}"/>
               </a:ext>
             </a:extLst>
           </p:cNvPr>
           <p:cNvCxnSpPr>
             <a:cxnSpLocks/>
-            <a:stCxn id="69" idx="1"/>
-            <a:endCxn id="28" idx="1"/>
           </p:cNvCxnSpPr>
           <p:nvPr/>
         </p:nvCxnSpPr>
         <p:spPr bwMode="auto">
-          <a:xfrm rot="10800000" flipH="1" flipV="1">
-            <a:off x="3215720" y="1252885"/>
-            <a:ext cx="871329" cy="4868367"/>
-          </a:xfrm>
-          <a:prstGeom prst="bentConnector3">
-            <a:avLst>
-              <a:gd name="adj1" fmla="val -281503"/>
-            </a:avLst>
-          </a:prstGeom>
-          <a:solidFill>
-            <a:srgbClr val="00B8FF"/>
-          </a:solidFill>
-          <a:ln w="25400" cap="flat" cmpd="sng" algn="ctr">
-            <a:solidFill>
-              <a:schemeClr val="tx2"/>
-            </a:solidFill>
-            <a:prstDash val="solid"/>
-            <a:round/>
-            <a:headEnd type="none" w="med" len="med"/>
-            <a:tailEnd type="arrow" w="med" len="med"/>
-          </a:ln>
-          <a:effectLst/>
-          <a:extLst>
-            <a:ext uri="{AF507438-7753-43e0-B8FC-AC1667EBCBE1}">
-              <a14:hiddenEffects xmlns:a14="http://schemas.microsoft.com/office/drawing/2010/main" xmlns="">
-                <a:effectLst>
-                  <a:outerShdw dist="35921" dir="2700000" algn="ctr" rotWithShape="0">
-                    <a:schemeClr val="bg2"/>
-                  </a:outerShdw>
-                </a:effectLst>
-              </a14:hiddenEffects>
-            </a:ext>
-          </a:extLst>
-        </p:spPr>
-      </p:cxnSp>
-      <p:cxnSp>
-        <p:nvCxnSpPr>
-          <p:cNvPr id="26" name="Elbow Connector 41">
-            <a:extLst>
-              <a:ext uri="{FF2B5EF4-FFF2-40B4-BE49-F238E27FC236}">
-                <a16:creationId xmlns:a16="http://schemas.microsoft.com/office/drawing/2014/main" id="{AC9AACFB-8FE8-2A8D-7CFA-03041C220373}"/>
-              </a:ext>
-            </a:extLst>
-          </p:cNvPr>
-          <p:cNvCxnSpPr>
-            <a:cxnSpLocks/>
-            <a:stCxn id="28" idx="3"/>
-            <a:endCxn id="69" idx="3"/>
-          </p:cNvCxnSpPr>
-          <p:nvPr/>
-        </p:nvCxnSpPr>
-        <p:spPr bwMode="auto">
-          <a:xfrm flipV="1">
-            <a:off x="7831466" y="1252886"/>
-            <a:ext cx="1321105" cy="4868367"/>
-          </a:xfrm>
-          <a:prstGeom prst="bentConnector3">
-            <a:avLst>
-              <a:gd name="adj1" fmla="val 278182"/>
-            </a:avLst>
+          <a:xfrm>
+            <a:off x="4231066" y="3728775"/>
+            <a:ext cx="0" cy="1996434"/>
+          </a:xfrm>
+          <a:prstGeom prst="straightConnector1">
+            <a:avLst/>
           </a:prstGeom>
           <a:solidFill>
             <a:srgbClr val="00B8FF"/>
@@ -5390,7 +5152,7 @@
           <a:effectLst/>
           <a:extLst>
             <a:ext uri="{AF507438-7753-43e0-B8FC-AC1667EBCBE1}">
-              <a14:hiddenEffects xmlns:a14="http://schemas.microsoft.com/office/drawing/2010/main" xmlns="">
+              <a14:hiddenEffects xmlns="" xmlns:a14="http://schemas.microsoft.com/office/drawing/2010/main">
                 <a:effectLst>
                   <a:outerShdw dist="35921" dir="2700000" algn="ctr" rotWithShape="0">
                     <a:schemeClr val="bg2"/>
@@ -5401,12 +5163,152 @@
           </a:extLst>
         </p:spPr>
       </p:cxnSp>
-      <p:sp>
-        <p:nvSpPr>
-          <p:cNvPr id="28" name="Rectangle 27">
-            <a:extLst>
-              <a:ext uri="{FF2B5EF4-FFF2-40B4-BE49-F238E27FC236}">
-                <a16:creationId xmlns:a16="http://schemas.microsoft.com/office/drawing/2014/main" id="{89A62A6D-BAF6-9D4D-600C-71AAAB2285A1}"/>
+      <p:cxnSp>
+        <p:nvCxnSpPr>
+          <p:cNvPr id="15" name="Straight Arrow Connector 19">
+            <a:extLst>
+              <a:ext uri="{FF2B5EF4-FFF2-40B4-BE49-F238E27FC236}">
+                <a16:creationId xmlns:a16="http://schemas.microsoft.com/office/drawing/2014/main" id="{9125E6AA-49B8-BC03-5993-8F0B31FE7D9F}"/>
+              </a:ext>
+            </a:extLst>
+          </p:cNvPr>
+          <p:cNvCxnSpPr>
+            <a:cxnSpLocks/>
+          </p:cNvCxnSpPr>
+          <p:nvPr/>
+        </p:nvCxnSpPr>
+        <p:spPr bwMode="auto">
+          <a:xfrm flipV="1">
+            <a:off x="7670682" y="3728775"/>
+            <a:ext cx="0" cy="1996434"/>
+          </a:xfrm>
+          <a:prstGeom prst="straightConnector1">
+            <a:avLst/>
+          </a:prstGeom>
+          <a:solidFill>
+            <a:srgbClr val="00B8FF"/>
+          </a:solidFill>
+          <a:ln w="25400" cap="flat" cmpd="sng" algn="ctr">
+            <a:solidFill>
+              <a:schemeClr val="tx2"/>
+            </a:solidFill>
+            <a:prstDash val="solid"/>
+            <a:round/>
+            <a:headEnd type="none" w="med" len="med"/>
+            <a:tailEnd type="arrow"/>
+          </a:ln>
+          <a:effectLst/>
+          <a:extLst>
+            <a:ext uri="{AF507438-7753-43e0-B8FC-AC1667EBCBE1}">
+              <a14:hiddenEffects xmlns="" xmlns:a14="http://schemas.microsoft.com/office/drawing/2010/main">
+                <a:effectLst>
+                  <a:outerShdw dist="35921" dir="2700000" algn="ctr" rotWithShape="0">
+                    <a:schemeClr val="bg2"/>
+                  </a:outerShdw>
+                </a:effectLst>
+              </a14:hiddenEffects>
+            </a:ext>
+          </a:extLst>
+        </p:spPr>
+      </p:cxnSp>
+      <p:cxnSp>
+        <p:nvCxnSpPr>
+          <p:cNvPr id="18" name="Straight Arrow Connector 26">
+            <a:extLst>
+              <a:ext uri="{FF2B5EF4-FFF2-40B4-BE49-F238E27FC236}">
+                <a16:creationId xmlns:a16="http://schemas.microsoft.com/office/drawing/2014/main" id="{EF169E77-6389-170C-77DC-557A11159329}"/>
+              </a:ext>
+            </a:extLst>
+          </p:cNvPr>
+          <p:cNvCxnSpPr/>
+          <p:nvPr/>
+        </p:nvCxnSpPr>
+        <p:spPr bwMode="auto">
+          <a:xfrm flipH="1">
+            <a:off x="4735122" y="3008695"/>
+            <a:ext cx="2592288" cy="0"/>
+          </a:xfrm>
+          <a:prstGeom prst="straightConnector1">
+            <a:avLst/>
+          </a:prstGeom>
+          <a:solidFill>
+            <a:srgbClr val="00B8FF"/>
+          </a:solidFill>
+          <a:ln w="25400" cap="flat" cmpd="sng" algn="ctr">
+            <a:solidFill>
+              <a:schemeClr val="tx2"/>
+            </a:solidFill>
+            <a:prstDash val="solid"/>
+            <a:round/>
+            <a:headEnd type="none" w="med" len="med"/>
+            <a:tailEnd type="arrow"/>
+          </a:ln>
+          <a:effectLst/>
+          <a:extLst>
+            <a:ext uri="{AF507438-7753-43e0-B8FC-AC1667EBCBE1}">
+              <a14:hiddenEffects xmlns="" xmlns:a14="http://schemas.microsoft.com/office/drawing/2010/main">
+                <a:effectLst>
+                  <a:outerShdw dist="35921" dir="2700000" algn="ctr" rotWithShape="0">
+                    <a:schemeClr val="bg2"/>
+                  </a:outerShdw>
+                </a:effectLst>
+              </a14:hiddenEffects>
+            </a:ext>
+          </a:extLst>
+        </p:spPr>
+      </p:cxnSp>
+      <p:cxnSp>
+        <p:nvCxnSpPr>
+          <p:cNvPr id="21" name="Straight Arrow Connector 29">
+            <a:extLst>
+              <a:ext uri="{FF2B5EF4-FFF2-40B4-BE49-F238E27FC236}">
+                <a16:creationId xmlns:a16="http://schemas.microsoft.com/office/drawing/2014/main" id="{2B6D812B-4818-8FC8-B64F-41472CC5D2D4}"/>
+              </a:ext>
+            </a:extLst>
+          </p:cNvPr>
+          <p:cNvCxnSpPr/>
+          <p:nvPr/>
+        </p:nvCxnSpPr>
+        <p:spPr bwMode="auto">
+          <a:xfrm>
+            <a:off x="4735122" y="3728775"/>
+            <a:ext cx="2592288" cy="0"/>
+          </a:xfrm>
+          <a:prstGeom prst="straightConnector1">
+            <a:avLst/>
+          </a:prstGeom>
+          <a:solidFill>
+            <a:srgbClr val="00B8FF"/>
+          </a:solidFill>
+          <a:ln w="25400" cap="flat" cmpd="sng" algn="ctr">
+            <a:solidFill>
+              <a:schemeClr val="tx2"/>
+            </a:solidFill>
+            <a:prstDash val="solid"/>
+            <a:round/>
+            <a:headEnd type="none" w="med" len="med"/>
+            <a:tailEnd type="arrow"/>
+          </a:ln>
+          <a:effectLst/>
+          <a:extLst>
+            <a:ext uri="{AF507438-7753-43e0-B8FC-AC1667EBCBE1}">
+              <a14:hiddenEffects xmlns="" xmlns:a14="http://schemas.microsoft.com/office/drawing/2010/main">
+                <a:effectLst>
+                  <a:outerShdw dist="35921" dir="2700000" algn="ctr" rotWithShape="0">
+                    <a:schemeClr val="bg2"/>
+                  </a:outerShdw>
+                </a:effectLst>
+              </a14:hiddenEffects>
+            </a:ext>
+          </a:extLst>
+        </p:spPr>
+      </p:cxnSp>
+      <p:sp>
+        <p:nvSpPr>
+          <p:cNvPr id="24" name="Rectangle 23">
+            <a:extLst>
+              <a:ext uri="{FF2B5EF4-FFF2-40B4-BE49-F238E27FC236}">
+                <a16:creationId xmlns:a16="http://schemas.microsoft.com/office/drawing/2014/main" id="{7263E808-C6AA-5A4C-3FA6-923B60D09384}"/>
               </a:ext>
             </a:extLst>
           </p:cNvPr>
@@ -5415,14 +5317,14 @@
         </p:nvSpPr>
         <p:spPr bwMode="auto">
           <a:xfrm>
-            <a:off x="4087050" y="5725209"/>
-            <a:ext cx="3744416" cy="792088"/>
+            <a:off x="0" y="0"/>
+            <a:ext cx="12191999" cy="1623409"/>
           </a:xfrm>
           <a:prstGeom prst="rect">
             <a:avLst/>
           </a:prstGeom>
           <a:solidFill>
-            <a:srgbClr val="4BACC7"/>
+            <a:srgbClr val="4E81BD"/>
           </a:solidFill>
         </p:spPr>
         <p:style>
@@ -5440,98 +5342,147 @@
           </a:fontRef>
         </p:style>
         <p:txBody>
-          <a:bodyPr rtlCol="0" anchor="ctr"/>
+          <a:bodyPr rtlCol="0" anchor="t" anchorCtr="0"/>
           <a:lstStyle/>
           <a:p>
             <a:pPr algn="ctr"/>
             <a:r>
-              <a:rPr lang="fr-FR" sz="2400" dirty="0">
+              <a:rPr lang="fr-FR" sz="3200" dirty="0">
                 <a:solidFill>
                   <a:schemeClr val="lt1"/>
                 </a:solidFill>
               </a:rPr>
-              <a:t>Parcours patient</a:t>
-            </a:r>
-          </a:p>
-        </p:txBody>
-      </p:sp>
-      <p:sp>
-        <p:nvSpPr>
-          <p:cNvPr id="62" name="Rectangle 61">
-            <a:extLst>
-              <a:ext uri="{FF2B5EF4-FFF2-40B4-BE49-F238E27FC236}">
-                <a16:creationId xmlns:a16="http://schemas.microsoft.com/office/drawing/2014/main" id="{30C7F49C-F965-1A0D-48B1-9559B6D03A21}"/>
+              <a:t>Environnement</a:t>
+            </a:r>
+          </a:p>
+        </p:txBody>
+      </p:sp>
+      <p:cxnSp>
+        <p:nvCxnSpPr>
+          <p:cNvPr id="25" name="Elbow Connector 21">
+            <a:extLst>
+              <a:ext uri="{FF2B5EF4-FFF2-40B4-BE49-F238E27FC236}">
+                <a16:creationId xmlns:a16="http://schemas.microsoft.com/office/drawing/2014/main" id="{F51DF801-ED9C-5D0C-14A6-C518D8BBBA9B}"/>
+              </a:ext>
+            </a:extLst>
+          </p:cNvPr>
+          <p:cNvCxnSpPr>
+            <a:cxnSpLocks/>
+            <a:stCxn id="69" idx="1"/>
+            <a:endCxn id="28" idx="1"/>
+          </p:cNvCxnSpPr>
+          <p:nvPr/>
+        </p:nvCxnSpPr>
+        <p:spPr bwMode="auto">
+          <a:xfrm rot="10800000" flipH="1" flipV="1">
+            <a:off x="3215720" y="1252885"/>
+            <a:ext cx="871329" cy="4868367"/>
+          </a:xfrm>
+          <a:prstGeom prst="bentConnector3">
+            <a:avLst>
+              <a:gd name="adj1" fmla="val -281503"/>
+            </a:avLst>
+          </a:prstGeom>
+          <a:solidFill>
+            <a:srgbClr val="00B8FF"/>
+          </a:solidFill>
+          <a:ln w="25400" cap="flat" cmpd="sng" algn="ctr">
+            <a:solidFill>
+              <a:schemeClr val="tx2"/>
+            </a:solidFill>
+            <a:prstDash val="solid"/>
+            <a:round/>
+            <a:headEnd type="none" w="med" len="med"/>
+            <a:tailEnd type="arrow" w="med" len="med"/>
+          </a:ln>
+          <a:effectLst/>
+          <a:extLst>
+            <a:ext uri="{AF507438-7753-43e0-B8FC-AC1667EBCBE1}">
+              <a14:hiddenEffects xmlns="" xmlns:a14="http://schemas.microsoft.com/office/drawing/2010/main">
+                <a:effectLst>
+                  <a:outerShdw dist="35921" dir="2700000" algn="ctr" rotWithShape="0">
+                    <a:schemeClr val="bg2"/>
+                  </a:outerShdw>
+                </a:effectLst>
+              </a14:hiddenEffects>
+            </a:ext>
+          </a:extLst>
+        </p:spPr>
+      </p:cxnSp>
+      <p:cxnSp>
+        <p:nvCxnSpPr>
+          <p:cNvPr id="26" name="Elbow Connector 41">
+            <a:extLst>
+              <a:ext uri="{FF2B5EF4-FFF2-40B4-BE49-F238E27FC236}">
+                <a16:creationId xmlns:a16="http://schemas.microsoft.com/office/drawing/2014/main" id="{AC9AACFB-8FE8-2A8D-7CFA-03041C220373}"/>
+              </a:ext>
+            </a:extLst>
+          </p:cNvPr>
+          <p:cNvCxnSpPr>
+            <a:cxnSpLocks/>
+            <a:stCxn id="28" idx="3"/>
+            <a:endCxn id="69" idx="3"/>
+          </p:cNvCxnSpPr>
+          <p:nvPr/>
+        </p:nvCxnSpPr>
+        <p:spPr bwMode="auto">
+          <a:xfrm flipV="1">
+            <a:off x="7831466" y="1252886"/>
+            <a:ext cx="1321105" cy="4868367"/>
+          </a:xfrm>
+          <a:prstGeom prst="bentConnector3">
+            <a:avLst>
+              <a:gd name="adj1" fmla="val 278182"/>
+            </a:avLst>
+          </a:prstGeom>
+          <a:solidFill>
+            <a:srgbClr val="00B8FF"/>
+          </a:solidFill>
+          <a:ln w="25400" cap="flat" cmpd="sng" algn="ctr">
+            <a:solidFill>
+              <a:schemeClr val="tx2"/>
+            </a:solidFill>
+            <a:prstDash val="solid"/>
+            <a:round/>
+            <a:headEnd type="none" w="med" len="med"/>
+            <a:tailEnd type="arrow"/>
+          </a:ln>
+          <a:effectLst/>
+          <a:extLst>
+            <a:ext uri="{AF507438-7753-43e0-B8FC-AC1667EBCBE1}">
+              <a14:hiddenEffects xmlns="" xmlns:a14="http://schemas.microsoft.com/office/drawing/2010/main">
+                <a:effectLst>
+                  <a:outerShdw dist="35921" dir="2700000" algn="ctr" rotWithShape="0">
+                    <a:schemeClr val="bg2"/>
+                  </a:outerShdw>
+                </a:effectLst>
+              </a14:hiddenEffects>
+            </a:ext>
+          </a:extLst>
+        </p:spPr>
+      </p:cxnSp>
+      <p:sp>
+        <p:nvSpPr>
+          <p:cNvPr id="28" name="Rectangle 27">
+            <a:extLst>
+              <a:ext uri="{FF2B5EF4-FFF2-40B4-BE49-F238E27FC236}">
+                <a16:creationId xmlns:a16="http://schemas.microsoft.com/office/drawing/2014/main" id="{89A62A6D-BAF6-9D4D-600C-71AAAB2285A1}"/>
               </a:ext>
             </a:extLst>
           </p:cNvPr>
           <p:cNvSpPr/>
           <p:nvPr/>
         </p:nvSpPr>
-        <p:spPr>
+        <p:spPr bwMode="auto">
           <a:xfrm>
-            <a:off x="1760706" y="2071991"/>
-            <a:ext cx="8764622" cy="4591096"/>
+            <a:off x="4087050" y="5725209"/>
+            <a:ext cx="3744416" cy="792088"/>
           </a:xfrm>
           <a:prstGeom prst="rect">
             <a:avLst/>
           </a:prstGeom>
-          <a:noFill/>
-          <a:ln>
-            <a:solidFill>
-              <a:schemeClr val="accent4">
-                <a:lumMod val="50000"/>
-              </a:schemeClr>
-            </a:solidFill>
-            <a:prstDash val="dash"/>
-          </a:ln>
-        </p:spPr>
-        <p:style>
-          <a:lnRef idx="2">
-            <a:schemeClr val="accent1">
-              <a:shade val="50000"/>
-            </a:schemeClr>
-          </a:lnRef>
-          <a:fillRef idx="1">
-            <a:schemeClr val="accent1"/>
-          </a:fillRef>
-          <a:effectRef idx="0">
-            <a:schemeClr val="accent1"/>
-          </a:effectRef>
-          <a:fontRef idx="minor">
-            <a:schemeClr val="lt1"/>
-          </a:fontRef>
-        </p:style>
-        <p:txBody>
-          <a:bodyPr rtlCol="0" anchor="ctr"/>
-          <a:lstStyle/>
-          <a:p>
-            <a:pPr algn="ctr"/>
-            <a:endParaRPr lang="fr-FR"/>
-          </a:p>
-        </p:txBody>
-      </p:sp>
-      <p:sp>
-        <p:nvSpPr>
-          <p:cNvPr id="69" name="Rectangle 68">
-            <a:extLst>
-              <a:ext uri="{FF2B5EF4-FFF2-40B4-BE49-F238E27FC236}">
-                <a16:creationId xmlns:a16="http://schemas.microsoft.com/office/drawing/2014/main" id="{E54A3ECF-DE12-2158-2887-3B961539FC6B}"/>
-              </a:ext>
-            </a:extLst>
-          </p:cNvPr>
-          <p:cNvSpPr/>
-          <p:nvPr/>
-        </p:nvSpPr>
-        <p:spPr bwMode="auto">
-          <a:xfrm>
-            <a:off x="3215721" y="1000840"/>
-            <a:ext cx="5936850" cy="504091"/>
-          </a:xfrm>
-          <a:prstGeom prst="rect">
-            <a:avLst/>
-          </a:prstGeom>
-          <a:solidFill>
-            <a:schemeClr val="bg1"/>
+          <a:solidFill>
+            <a:srgbClr val="4BACC7"/>
           </a:solidFill>
         </p:spPr>
         <p:style>
@@ -5549,6 +5500,60 @@
           </a:fontRef>
         </p:style>
         <p:txBody>
+          <a:bodyPr rtlCol="0" anchor="ctr"/>
+          <a:lstStyle/>
+          <a:p>
+            <a:pPr algn="ctr"/>
+            <a:r>
+              <a:rPr lang="fr-FR" sz="2400" dirty="0">
+                <a:solidFill>
+                  <a:schemeClr val="lt1"/>
+                </a:solidFill>
+              </a:rPr>
+              <a:t>Parcours patient</a:t>
+            </a:r>
+          </a:p>
+        </p:txBody>
+      </p:sp>
+      <p:sp>
+        <p:nvSpPr>
+          <p:cNvPr id="69" name="Rectangle 68">
+            <a:extLst>
+              <a:ext uri="{FF2B5EF4-FFF2-40B4-BE49-F238E27FC236}">
+                <a16:creationId xmlns:a16="http://schemas.microsoft.com/office/drawing/2014/main" id="{E54A3ECF-DE12-2158-2887-3B961539FC6B}"/>
+              </a:ext>
+            </a:extLst>
+          </p:cNvPr>
+          <p:cNvSpPr/>
+          <p:nvPr/>
+        </p:nvSpPr>
+        <p:spPr bwMode="auto">
+          <a:xfrm>
+            <a:off x="3215721" y="1000840"/>
+            <a:ext cx="5936850" cy="504091"/>
+          </a:xfrm>
+          <a:prstGeom prst="rect">
+            <a:avLst/>
+          </a:prstGeom>
+          <a:solidFill>
+            <a:schemeClr val="bg1"/>
+          </a:solidFill>
+        </p:spPr>
+        <p:style>
+          <a:lnRef idx="1">
+            <a:schemeClr val="accent1"/>
+          </a:lnRef>
+          <a:fillRef idx="3">
+            <a:schemeClr val="accent1"/>
+          </a:fillRef>
+          <a:effectRef idx="2">
+            <a:schemeClr val="accent1"/>
+          </a:effectRef>
+          <a:fontRef idx="minor">
+            <a:schemeClr val="lt1"/>
+          </a:fontRef>
+        </p:style>
+        <p:txBody>
           <a:bodyPr rtlCol="0" anchor="t" anchorCtr="0"/>
           <a:lstStyle/>
           <a:p>
@@ -5565,6 +5570,765 @@
     <p:extLst>
       <p:ext uri="{BB962C8B-B14F-4D97-AF65-F5344CB8AC3E}">
         <p14:creationId xmlns:p14="http://schemas.microsoft.com/office/powerpoint/2010/main" val="2193615749"/>
+      </p:ext>
+    </p:extLst>
+  </p:cSld>
+  <p:clrMapOvr>
+    <a:masterClrMapping/>
+  </p:clrMapOvr>
+  <p:timing>
+    <p:tnLst>
+      <p:par>
+        <p:cTn id="1" dur="indefinite" restart="never" nodeType="tmRoot">
+          <p:childTnLst>
+            <p:seq concurrent="1" nextAc="seek">
+              <p:cTn id="2" dur="indefinite" nodeType="mainSeq">
+                <p:childTnLst>
+                  <p:par>
+                    <p:cTn id="3" fill="hold">
+                      <p:stCondLst>
+                        <p:cond delay="indefinite"/>
+                      </p:stCondLst>
+                      <p:childTnLst>
+                        <p:par>
+                          <p:cTn id="4" fill="hold">
+                            <p:stCondLst>
+                              <p:cond delay="0"/>
+                            </p:stCondLst>
+                            <p:childTnLst>
+                              <p:par>
+                                <p:cTn id="5" presetID="1" presetClass="entr" presetSubtype="0" fill="hold" grpId="0" nodeType="clickEffect">
+                                  <p:stCondLst>
+                                    <p:cond delay="0"/>
+                                  </p:stCondLst>
+                                  <p:childTnLst>
+                                    <p:set>
+                                      <p:cBhvr>
+                                        <p:cTn id="6" dur="1" fill="hold">
+                                          <p:stCondLst>
+                                            <p:cond delay="0"/>
+                                          </p:stCondLst>
+                                        </p:cTn>
+                                        <p:tgtEl>
+                                          <p:spTgt spid="2"/>
+                                        </p:tgtEl>
+                                        <p:attrNameLst>
+                                          <p:attrName>style.visibility</p:attrName>
+                                        </p:attrNameLst>
+                                      </p:cBhvr>
+                                      <p:to>
+                                        <p:strVal val="visible"/>
+                                      </p:to>
+                                    </p:set>
+                                  </p:childTnLst>
+                                </p:cTn>
+                              </p:par>
+                            </p:childTnLst>
+                          </p:cTn>
+                        </p:par>
+                      </p:childTnLst>
+                    </p:cTn>
+                  </p:par>
+                </p:childTnLst>
+              </p:cTn>
+              <p:prevCondLst>
+                <p:cond evt="onPrev" delay="0">
+                  <p:tgtEl>
+                    <p:sldTgt/>
+                  </p:tgtEl>
+                </p:cond>
+              </p:prevCondLst>
+              <p:nextCondLst>
+                <p:cond evt="onNext" delay="0">
+                  <p:tgtEl>
+                    <p:sldTgt/>
+                  </p:tgtEl>
+                </p:cond>
+              </p:nextCondLst>
+            </p:seq>
+          </p:childTnLst>
+        </p:cTn>
+      </p:par>
+    </p:tnLst>
+    <p:bldLst>
+      <p:bldP spid="2" grpId="0" animBg="1"/>
+    </p:bldLst>
+  </p:timing>
+</p:sld>
+</file>
+
+<file path=ppt/slides/slide3.xml><?xml version="1.0" encoding="utf-8"?>
+<p:sld xmlns:a="http://schemas.openxmlformats.org/drawingml/2006/main" xmlns:r="http://schemas.openxmlformats.org/officeDocument/2006/relationships" xmlns:p="http://schemas.openxmlformats.org/presentationml/2006/main">
+  <p:cSld>
+    <p:spTree>
+      <p:nvGrpSpPr>
+        <p:cNvPr id="1" name=""/>
+        <p:cNvGrpSpPr/>
+        <p:nvPr/>
+      </p:nvGrpSpPr>
+      <p:grpSpPr>
+        <a:xfrm>
+          <a:off x="0" y="0"/>
+          <a:ext cx="0" cy="0"/>
+          <a:chOff x="0" y="0"/>
+          <a:chExt cx="0" cy="0"/>
+        </a:xfrm>
+      </p:grpSpPr>
+      <p:sp>
+        <p:nvSpPr>
+          <p:cNvPr id="3" name="Rectangle 2">
+            <a:extLst>
+              <a:ext uri="{FF2B5EF4-FFF2-40B4-BE49-F238E27FC236}">
+                <a16:creationId xmlns:a16="http://schemas.microsoft.com/office/drawing/2014/main" id="{CCCE5597-8D95-E3D1-CD28-774321259292}"/>
+              </a:ext>
+            </a:extLst>
+          </p:cNvPr>
+          <p:cNvSpPr/>
+          <p:nvPr/>
+        </p:nvSpPr>
+        <p:spPr bwMode="auto">
+          <a:xfrm>
+            <a:off x="-15154" y="1621614"/>
+            <a:ext cx="12191999" cy="5236386"/>
+          </a:xfrm>
+          <a:prstGeom prst="rect">
+            <a:avLst/>
+          </a:prstGeom>
+          <a:solidFill>
+            <a:schemeClr val="accent1">
+              <a:lumMod val="20000"/>
+              <a:lumOff val="80000"/>
+            </a:schemeClr>
+          </a:solidFill>
+          <a:ln>
+            <a:noFill/>
+          </a:ln>
+        </p:spPr>
+        <p:style>
+          <a:lnRef idx="1">
+            <a:schemeClr val="accent1"/>
+          </a:lnRef>
+          <a:fillRef idx="3">
+            <a:schemeClr val="accent1"/>
+          </a:fillRef>
+          <a:effectRef idx="2">
+            <a:schemeClr val="accent1"/>
+          </a:effectRef>
+          <a:fontRef idx="minor">
+            <a:schemeClr val="lt1"/>
+          </a:fontRef>
+        </p:style>
+        <p:txBody>
+          <a:bodyPr rtlCol="0" anchor="t" anchorCtr="0"/>
+          <a:lstStyle/>
+          <a:p>
+            <a:pPr algn="ctr"/>
+            <a:endParaRPr lang="fr-FR" sz="3200" dirty="0">
+              <a:solidFill>
+                <a:schemeClr val="lt1"/>
+              </a:solidFill>
+            </a:endParaRPr>
+          </a:p>
+        </p:txBody>
+      </p:sp>
+      <p:sp>
+        <p:nvSpPr>
+          <p:cNvPr id="2" name="Rectangle 1">
+            <a:extLst>
+              <a:ext uri="{FF2B5EF4-FFF2-40B4-BE49-F238E27FC236}">
+                <a16:creationId xmlns:a16="http://schemas.microsoft.com/office/drawing/2014/main" id="{761B9443-38CF-0D90-A9B5-3473D15B9FBA}"/>
+              </a:ext>
+            </a:extLst>
+          </p:cNvPr>
+          <p:cNvSpPr/>
+          <p:nvPr/>
+        </p:nvSpPr>
+        <p:spPr bwMode="auto">
+          <a:xfrm>
+            <a:off x="7327410" y="2936687"/>
+            <a:ext cx="2448272" cy="792088"/>
+          </a:xfrm>
+          <a:prstGeom prst="rect">
+            <a:avLst/>
+          </a:prstGeom>
+          <a:solidFill>
+            <a:srgbClr val="4BACC7"/>
+          </a:solidFill>
+        </p:spPr>
+        <p:style>
+          <a:lnRef idx="1">
+            <a:schemeClr val="accent1"/>
+          </a:lnRef>
+          <a:fillRef idx="3">
+            <a:schemeClr val="accent1"/>
+          </a:fillRef>
+          <a:effectRef idx="2">
+            <a:schemeClr val="accent1"/>
+          </a:effectRef>
+          <a:fontRef idx="minor">
+            <a:schemeClr val="lt1"/>
+          </a:fontRef>
+        </p:style>
+        <p:txBody>
+          <a:bodyPr rtlCol="0" anchor="ctr"/>
+          <a:lstStyle/>
+          <a:p>
+            <a:pPr algn="ctr"/>
+            <a:r>
+              <a:rPr lang="fr-FR" sz="2400" dirty="0">
+                <a:solidFill>
+                  <a:schemeClr val="lt1"/>
+                </a:solidFill>
+              </a:rPr>
+              <a:t>S.I.</a:t>
+            </a:r>
+          </a:p>
+        </p:txBody>
+      </p:sp>
+      <p:cxnSp>
+        <p:nvCxnSpPr>
+          <p:cNvPr id="4" name="Straight Arrow Connector 3">
+            <a:extLst>
+              <a:ext uri="{FF2B5EF4-FFF2-40B4-BE49-F238E27FC236}">
+                <a16:creationId xmlns:a16="http://schemas.microsoft.com/office/drawing/2014/main" id="{7F745A67-579B-41E4-CD3E-9F59AA81811E}"/>
+              </a:ext>
+            </a:extLst>
+          </p:cNvPr>
+          <p:cNvCxnSpPr>
+            <a:cxnSpLocks/>
+          </p:cNvCxnSpPr>
+          <p:nvPr/>
+        </p:nvCxnSpPr>
+        <p:spPr bwMode="auto">
+          <a:xfrm flipV="1">
+            <a:off x="4519098" y="1623409"/>
+            <a:ext cx="0" cy="1313278"/>
+          </a:xfrm>
+          <a:prstGeom prst="straightConnector1">
+            <a:avLst/>
+          </a:prstGeom>
+          <a:solidFill>
+            <a:srgbClr val="00B8FF"/>
+          </a:solidFill>
+          <a:ln w="25400" cap="flat" cmpd="sng" algn="ctr">
+            <a:solidFill>
+              <a:schemeClr val="tx2"/>
+            </a:solidFill>
+            <a:prstDash val="solid"/>
+            <a:round/>
+            <a:headEnd type="none" w="med" len="med"/>
+            <a:tailEnd type="arrow"/>
+          </a:ln>
+          <a:effectLst/>
+          <a:extLst>
+            <a:ext uri="{AF507438-7753-43e0-B8FC-AC1667EBCBE1}">
+              <a14:hiddenEffects xmlns="" xmlns:a14="http://schemas.microsoft.com/office/drawing/2010/main">
+                <a:effectLst>
+                  <a:outerShdw dist="35921" dir="2700000" algn="ctr" rotWithShape="0">
+                    <a:schemeClr val="bg2"/>
+                  </a:outerShdw>
+                </a:effectLst>
+              </a14:hiddenEffects>
+            </a:ext>
+          </a:extLst>
+        </p:spPr>
+      </p:cxnSp>
+      <p:cxnSp>
+        <p:nvCxnSpPr>
+          <p:cNvPr id="7" name="Straight Arrow Connector 14">
+            <a:extLst>
+              <a:ext uri="{FF2B5EF4-FFF2-40B4-BE49-F238E27FC236}">
+                <a16:creationId xmlns:a16="http://schemas.microsoft.com/office/drawing/2014/main" id="{6DFA526A-ADCB-24F6-DCEB-22B273BFBE52}"/>
+              </a:ext>
+            </a:extLst>
+          </p:cNvPr>
+          <p:cNvCxnSpPr>
+            <a:cxnSpLocks/>
+          </p:cNvCxnSpPr>
+          <p:nvPr/>
+        </p:nvCxnSpPr>
+        <p:spPr bwMode="auto">
+          <a:xfrm>
+            <a:off x="7471426" y="1623409"/>
+            <a:ext cx="0" cy="1313278"/>
+          </a:xfrm>
+          <a:prstGeom prst="straightConnector1">
+            <a:avLst/>
+          </a:prstGeom>
+          <a:solidFill>
+            <a:srgbClr val="00B8FF"/>
+          </a:solidFill>
+          <a:ln w="25400" cap="flat" cmpd="sng" algn="ctr">
+            <a:solidFill>
+              <a:schemeClr val="tx2"/>
+            </a:solidFill>
+            <a:prstDash val="solid"/>
+            <a:round/>
+            <a:headEnd type="none" w="med" len="med"/>
+            <a:tailEnd type="arrow"/>
+          </a:ln>
+          <a:effectLst/>
+          <a:extLst>
+            <a:ext uri="{AF507438-7753-43e0-B8FC-AC1667EBCBE1}">
+              <a14:hiddenEffects xmlns="" xmlns:a14="http://schemas.microsoft.com/office/drawing/2010/main">
+                <a:effectLst>
+                  <a:outerShdw dist="35921" dir="2700000" algn="ctr" rotWithShape="0">
+                    <a:schemeClr val="bg2"/>
+                  </a:outerShdw>
+                </a:effectLst>
+              </a14:hiddenEffects>
+            </a:ext>
+          </a:extLst>
+        </p:spPr>
+      </p:cxnSp>
+      <p:sp>
+        <p:nvSpPr>
+          <p:cNvPr id="10" name="Rectangle 9">
+            <a:extLst>
+              <a:ext uri="{FF2B5EF4-FFF2-40B4-BE49-F238E27FC236}">
+                <a16:creationId xmlns:a16="http://schemas.microsoft.com/office/drawing/2014/main" id="{4B0DB749-F556-DA2A-2BBB-06145B53FE13}"/>
+              </a:ext>
+            </a:extLst>
+          </p:cNvPr>
+          <p:cNvSpPr/>
+          <p:nvPr/>
+        </p:nvSpPr>
+        <p:spPr bwMode="auto">
+          <a:xfrm>
+            <a:off x="2286850" y="2936687"/>
+            <a:ext cx="2448272" cy="792088"/>
+          </a:xfrm>
+          <a:prstGeom prst="rect">
+            <a:avLst/>
+          </a:prstGeom>
+          <a:solidFill>
+            <a:srgbClr val="4BACC7"/>
+          </a:solidFill>
+        </p:spPr>
+        <p:style>
+          <a:lnRef idx="1">
+            <a:schemeClr val="accent1"/>
+          </a:lnRef>
+          <a:fillRef idx="3">
+            <a:schemeClr val="accent1"/>
+          </a:fillRef>
+          <a:effectRef idx="2">
+            <a:schemeClr val="accent1"/>
+          </a:effectRef>
+          <a:fontRef idx="minor">
+            <a:schemeClr val="lt1"/>
+          </a:fontRef>
+        </p:style>
+        <p:txBody>
+          <a:bodyPr rtlCol="0" anchor="ctr"/>
+          <a:lstStyle/>
+          <a:p>
+            <a:pPr algn="ctr"/>
+            <a:r>
+              <a:rPr lang="fr-FR" sz="2400" dirty="0"/>
+              <a:t>Pilotage</a:t>
+            </a:r>
+          </a:p>
+        </p:txBody>
+      </p:sp>
+      <p:cxnSp>
+        <p:nvCxnSpPr>
+          <p:cNvPr id="12" name="Straight Arrow Connector 17">
+            <a:extLst>
+              <a:ext uri="{FF2B5EF4-FFF2-40B4-BE49-F238E27FC236}">
+                <a16:creationId xmlns:a16="http://schemas.microsoft.com/office/drawing/2014/main" id="{0C379FC2-1A73-56FC-11C1-344BCF3BDCC9}"/>
+              </a:ext>
+            </a:extLst>
+          </p:cNvPr>
+          <p:cNvCxnSpPr>
+            <a:cxnSpLocks/>
+          </p:cNvCxnSpPr>
+          <p:nvPr/>
+        </p:nvCxnSpPr>
+        <p:spPr bwMode="auto">
+          <a:xfrm>
+            <a:off x="4231066" y="3728775"/>
+            <a:ext cx="0" cy="1996434"/>
+          </a:xfrm>
+          <a:prstGeom prst="straightConnector1">
+            <a:avLst/>
+          </a:prstGeom>
+          <a:solidFill>
+            <a:srgbClr val="00B8FF"/>
+          </a:solidFill>
+          <a:ln w="25400" cap="flat" cmpd="sng" algn="ctr">
+            <a:solidFill>
+              <a:schemeClr val="tx2"/>
+            </a:solidFill>
+            <a:prstDash val="solid"/>
+            <a:round/>
+            <a:headEnd type="none" w="med" len="med"/>
+            <a:tailEnd type="arrow"/>
+          </a:ln>
+          <a:effectLst/>
+          <a:extLst>
+            <a:ext uri="{AF507438-7753-43e0-B8FC-AC1667EBCBE1}">
+              <a14:hiddenEffects xmlns="" xmlns:a14="http://schemas.microsoft.com/office/drawing/2010/main">
+                <a:effectLst>
+                  <a:outerShdw dist="35921" dir="2700000" algn="ctr" rotWithShape="0">
+                    <a:schemeClr val="bg2"/>
+                  </a:outerShdw>
+                </a:effectLst>
+              </a14:hiddenEffects>
+            </a:ext>
+          </a:extLst>
+        </p:spPr>
+      </p:cxnSp>
+      <p:cxnSp>
+        <p:nvCxnSpPr>
+          <p:cNvPr id="15" name="Straight Arrow Connector 19">
+            <a:extLst>
+              <a:ext uri="{FF2B5EF4-FFF2-40B4-BE49-F238E27FC236}">
+                <a16:creationId xmlns:a16="http://schemas.microsoft.com/office/drawing/2014/main" id="{9125E6AA-49B8-BC03-5993-8F0B31FE7D9F}"/>
+              </a:ext>
+            </a:extLst>
+          </p:cNvPr>
+          <p:cNvCxnSpPr>
+            <a:cxnSpLocks/>
+          </p:cNvCxnSpPr>
+          <p:nvPr/>
+        </p:nvCxnSpPr>
+        <p:spPr bwMode="auto">
+          <a:xfrm flipV="1">
+            <a:off x="7670682" y="3728775"/>
+            <a:ext cx="0" cy="1996434"/>
+          </a:xfrm>
+          <a:prstGeom prst="straightConnector1">
+            <a:avLst/>
+          </a:prstGeom>
+          <a:solidFill>
+            <a:srgbClr val="00B8FF"/>
+          </a:solidFill>
+          <a:ln w="25400" cap="flat" cmpd="sng" algn="ctr">
+            <a:solidFill>
+              <a:schemeClr val="tx2"/>
+            </a:solidFill>
+            <a:prstDash val="solid"/>
+            <a:round/>
+            <a:headEnd type="none" w="med" len="med"/>
+            <a:tailEnd type="arrow"/>
+          </a:ln>
+          <a:effectLst/>
+          <a:extLst>
+            <a:ext uri="{AF507438-7753-43e0-B8FC-AC1667EBCBE1}">
+              <a14:hiddenEffects xmlns="" xmlns:a14="http://schemas.microsoft.com/office/drawing/2010/main">
+                <a:effectLst>
+                  <a:outerShdw dist="35921" dir="2700000" algn="ctr" rotWithShape="0">
+                    <a:schemeClr val="bg2"/>
+                  </a:outerShdw>
+                </a:effectLst>
+              </a14:hiddenEffects>
+            </a:ext>
+          </a:extLst>
+        </p:spPr>
+      </p:cxnSp>
+      <p:cxnSp>
+        <p:nvCxnSpPr>
+          <p:cNvPr id="18" name="Straight Arrow Connector 26">
+            <a:extLst>
+              <a:ext uri="{FF2B5EF4-FFF2-40B4-BE49-F238E27FC236}">
+                <a16:creationId xmlns:a16="http://schemas.microsoft.com/office/drawing/2014/main" id="{EF169E77-6389-170C-77DC-557A11159329}"/>
+              </a:ext>
+            </a:extLst>
+          </p:cNvPr>
+          <p:cNvCxnSpPr/>
+          <p:nvPr/>
+        </p:nvCxnSpPr>
+        <p:spPr bwMode="auto">
+          <a:xfrm flipH="1">
+            <a:off x="4735122" y="3008695"/>
+            <a:ext cx="2592288" cy="0"/>
+          </a:xfrm>
+          <a:prstGeom prst="straightConnector1">
+            <a:avLst/>
+          </a:prstGeom>
+          <a:solidFill>
+            <a:srgbClr val="00B8FF"/>
+          </a:solidFill>
+          <a:ln w="25400" cap="flat" cmpd="sng" algn="ctr">
+            <a:solidFill>
+              <a:schemeClr val="tx2"/>
+            </a:solidFill>
+            <a:prstDash val="solid"/>
+            <a:round/>
+            <a:headEnd type="none" w="med" len="med"/>
+            <a:tailEnd type="arrow"/>
+          </a:ln>
+          <a:effectLst/>
+          <a:extLst>
+            <a:ext uri="{AF507438-7753-43e0-B8FC-AC1667EBCBE1}">
+              <a14:hiddenEffects xmlns="" xmlns:a14="http://schemas.microsoft.com/office/drawing/2010/main">
+                <a:effectLst>
+                  <a:outerShdw dist="35921" dir="2700000" algn="ctr" rotWithShape="0">
+                    <a:schemeClr val="bg2"/>
+                  </a:outerShdw>
+                </a:effectLst>
+              </a14:hiddenEffects>
+            </a:ext>
+          </a:extLst>
+        </p:spPr>
+      </p:cxnSp>
+      <p:cxnSp>
+        <p:nvCxnSpPr>
+          <p:cNvPr id="21" name="Straight Arrow Connector 29">
+            <a:extLst>
+              <a:ext uri="{FF2B5EF4-FFF2-40B4-BE49-F238E27FC236}">
+                <a16:creationId xmlns:a16="http://schemas.microsoft.com/office/drawing/2014/main" id="{2B6D812B-4818-8FC8-B64F-41472CC5D2D4}"/>
+              </a:ext>
+            </a:extLst>
+          </p:cNvPr>
+          <p:cNvCxnSpPr/>
+          <p:nvPr/>
+        </p:nvCxnSpPr>
+        <p:spPr bwMode="auto">
+          <a:xfrm>
+            <a:off x="4735122" y="3728775"/>
+            <a:ext cx="2592288" cy="0"/>
+          </a:xfrm>
+          <a:prstGeom prst="straightConnector1">
+            <a:avLst/>
+          </a:prstGeom>
+          <a:solidFill>
+            <a:srgbClr val="00B8FF"/>
+          </a:solidFill>
+          <a:ln w="25400" cap="flat" cmpd="sng" algn="ctr">
+            <a:solidFill>
+              <a:schemeClr val="tx2"/>
+            </a:solidFill>
+            <a:prstDash val="solid"/>
+            <a:round/>
+            <a:headEnd type="none" w="med" len="med"/>
+            <a:tailEnd type="arrow"/>
+          </a:ln>
+          <a:effectLst/>
+          <a:extLst>
+            <a:ext uri="{AF507438-7753-43e0-B8FC-AC1667EBCBE1}">
+              <a14:hiddenEffects xmlns="" xmlns:a14="http://schemas.microsoft.com/office/drawing/2010/main">
+                <a:effectLst>
+                  <a:outerShdw dist="35921" dir="2700000" algn="ctr" rotWithShape="0">
+                    <a:schemeClr val="bg2"/>
+                  </a:outerShdw>
+                </a:effectLst>
+              </a14:hiddenEffects>
+            </a:ext>
+          </a:extLst>
+        </p:spPr>
+      </p:cxnSp>
+      <p:sp>
+        <p:nvSpPr>
+          <p:cNvPr id="24" name="Rectangle 23">
+            <a:extLst>
+              <a:ext uri="{FF2B5EF4-FFF2-40B4-BE49-F238E27FC236}">
+                <a16:creationId xmlns:a16="http://schemas.microsoft.com/office/drawing/2014/main" id="{7263E808-C6AA-5A4C-3FA6-923B60D09384}"/>
+              </a:ext>
+            </a:extLst>
+          </p:cNvPr>
+          <p:cNvSpPr/>
+          <p:nvPr/>
+        </p:nvSpPr>
+        <p:spPr bwMode="auto">
+          <a:xfrm>
+            <a:off x="0" y="0"/>
+            <a:ext cx="12191999" cy="1623409"/>
+          </a:xfrm>
+          <a:prstGeom prst="rect">
+            <a:avLst/>
+          </a:prstGeom>
+          <a:solidFill>
+            <a:srgbClr val="4E81BD"/>
+          </a:solidFill>
+        </p:spPr>
+        <p:style>
+          <a:lnRef idx="1">
+            <a:schemeClr val="accent1"/>
+          </a:lnRef>
+          <a:fillRef idx="3">
+            <a:schemeClr val="accent1"/>
+          </a:fillRef>
+          <a:effectRef idx="2">
+            <a:schemeClr val="accent1"/>
+          </a:effectRef>
+          <a:fontRef idx="minor">
+            <a:schemeClr val="lt1"/>
+          </a:fontRef>
+        </p:style>
+        <p:txBody>
+          <a:bodyPr rtlCol="0" anchor="t" anchorCtr="0"/>
+          <a:lstStyle/>
+          <a:p>
+            <a:pPr algn="ctr"/>
+            <a:r>
+              <a:rPr lang="fr-FR" sz="3200" dirty="0">
+                <a:solidFill>
+                  <a:schemeClr val="lt1"/>
+                </a:solidFill>
+              </a:rPr>
+              <a:t>Environnement</a:t>
+            </a:r>
+          </a:p>
+        </p:txBody>
+      </p:sp>
+      <p:cxnSp>
+        <p:nvCxnSpPr>
+          <p:cNvPr id="25" name="Elbow Connector 21">
+            <a:extLst>
+              <a:ext uri="{FF2B5EF4-FFF2-40B4-BE49-F238E27FC236}">
+                <a16:creationId xmlns:a16="http://schemas.microsoft.com/office/drawing/2014/main" id="{F51DF801-ED9C-5D0C-14A6-C518D8BBBA9B}"/>
+              </a:ext>
+            </a:extLst>
+          </p:cNvPr>
+          <p:cNvCxnSpPr>
+            <a:cxnSpLocks/>
+            <a:endCxn id="28" idx="1"/>
+          </p:cNvCxnSpPr>
+          <p:nvPr/>
+        </p:nvCxnSpPr>
+        <p:spPr bwMode="auto">
+          <a:xfrm rot="16200000" flipH="1">
+            <a:off x="129310" y="2163512"/>
+            <a:ext cx="4499639" cy="3415841"/>
+          </a:xfrm>
+          <a:prstGeom prst="bentConnector2">
+            <a:avLst/>
+          </a:prstGeom>
+          <a:solidFill>
+            <a:srgbClr val="00B8FF"/>
+          </a:solidFill>
+          <a:ln w="25400" cap="flat" cmpd="sng" algn="ctr">
+            <a:solidFill>
+              <a:schemeClr val="tx2"/>
+            </a:solidFill>
+            <a:prstDash val="solid"/>
+            <a:round/>
+            <a:headEnd type="none" w="med" len="med"/>
+            <a:tailEnd type="arrow" w="med" len="med"/>
+          </a:ln>
+          <a:effectLst/>
+          <a:extLst>
+            <a:ext uri="{AF507438-7753-43e0-B8FC-AC1667EBCBE1}">
+              <a14:hiddenEffects xmlns="" xmlns:a14="http://schemas.microsoft.com/office/drawing/2010/main">
+                <a:effectLst>
+                  <a:outerShdw dist="35921" dir="2700000" algn="ctr" rotWithShape="0">
+                    <a:schemeClr val="bg2"/>
+                  </a:outerShdw>
+                </a:effectLst>
+              </a14:hiddenEffects>
+            </a:ext>
+          </a:extLst>
+        </p:spPr>
+      </p:cxnSp>
+      <p:cxnSp>
+        <p:nvCxnSpPr>
+          <p:cNvPr id="26" name="Elbow Connector 41">
+            <a:extLst>
+              <a:ext uri="{FF2B5EF4-FFF2-40B4-BE49-F238E27FC236}">
+                <a16:creationId xmlns:a16="http://schemas.microsoft.com/office/drawing/2014/main" id="{AC9AACFB-8FE8-2A8D-7CFA-03041C220373}"/>
+              </a:ext>
+            </a:extLst>
+          </p:cNvPr>
+          <p:cNvCxnSpPr>
+            <a:cxnSpLocks/>
+            <a:stCxn id="28" idx="3"/>
+          </p:cNvCxnSpPr>
+          <p:nvPr/>
+        </p:nvCxnSpPr>
+        <p:spPr bwMode="auto">
+          <a:xfrm flipV="1">
+            <a:off x="7831466" y="1621613"/>
+            <a:ext cx="3890364" cy="4499640"/>
+          </a:xfrm>
+          <a:prstGeom prst="bentConnector2">
+            <a:avLst/>
+          </a:prstGeom>
+          <a:solidFill>
+            <a:srgbClr val="00B8FF"/>
+          </a:solidFill>
+          <a:ln w="25400" cap="flat" cmpd="sng" algn="ctr">
+            <a:solidFill>
+              <a:schemeClr val="tx2"/>
+            </a:solidFill>
+            <a:prstDash val="solid"/>
+            <a:round/>
+            <a:headEnd type="none" w="med" len="med"/>
+            <a:tailEnd type="arrow"/>
+          </a:ln>
+          <a:effectLst/>
+          <a:extLst>
+            <a:ext uri="{AF507438-7753-43e0-B8FC-AC1667EBCBE1}">
+              <a14:hiddenEffects xmlns="" xmlns:a14="http://schemas.microsoft.com/office/drawing/2010/main">
+                <a:effectLst>
+                  <a:outerShdw dist="35921" dir="2700000" algn="ctr" rotWithShape="0">
+                    <a:schemeClr val="bg2"/>
+                  </a:outerShdw>
+                </a:effectLst>
+              </a14:hiddenEffects>
+            </a:ext>
+          </a:extLst>
+        </p:spPr>
+      </p:cxnSp>
+      <p:sp>
+        <p:nvSpPr>
+          <p:cNvPr id="28" name="Rectangle 27">
+            <a:extLst>
+              <a:ext uri="{FF2B5EF4-FFF2-40B4-BE49-F238E27FC236}">
+                <a16:creationId xmlns:a16="http://schemas.microsoft.com/office/drawing/2014/main" id="{89A62A6D-BAF6-9D4D-600C-71AAAB2285A1}"/>
+              </a:ext>
+            </a:extLst>
+          </p:cNvPr>
+          <p:cNvSpPr/>
+          <p:nvPr/>
+        </p:nvSpPr>
+        <p:spPr bwMode="auto">
+          <a:xfrm>
+            <a:off x="4087050" y="5725209"/>
+            <a:ext cx="3744416" cy="792088"/>
+          </a:xfrm>
+          <a:prstGeom prst="rect">
+            <a:avLst/>
+          </a:prstGeom>
+          <a:solidFill>
+            <a:srgbClr val="4BACC7"/>
+          </a:solidFill>
+        </p:spPr>
+        <p:style>
+          <a:lnRef idx="1">
+            <a:schemeClr val="accent1"/>
+          </a:lnRef>
+          <a:fillRef idx="3">
+            <a:schemeClr val="accent1"/>
+          </a:fillRef>
+          <a:effectRef idx="2">
+            <a:schemeClr val="accent1"/>
+          </a:effectRef>
+          <a:fontRef idx="minor">
+            <a:schemeClr val="lt1"/>
+          </a:fontRef>
+        </p:style>
+        <p:txBody>
+          <a:bodyPr rtlCol="0" anchor="ctr"/>
+          <a:lstStyle/>
+          <a:p>
+            <a:pPr algn="ctr"/>
+            <a:r>
+              <a:rPr lang="fr-FR" sz="2400" dirty="0">
+                <a:solidFill>
+                  <a:schemeClr val="lt1"/>
+                </a:solidFill>
+              </a:rPr>
+              <a:t>Parcours patient</a:t>
+            </a:r>
+          </a:p>
+        </p:txBody>
+      </p:sp>
+    </p:spTree>
+    <p:extLst>
+      <p:ext uri="{BB962C8B-B14F-4D97-AF65-F5344CB8AC3E}">
+        <p14:creationId xmlns:p14="http://schemas.microsoft.com/office/powerpoint/2010/main" val="1258800418"/>
       </p:ext>
     </p:extLst>
   </p:cSld>

</xml_diff>